<commit_message>
Organigramme tdr, présentation complétée
</commit_message>
<xml_diff>
--- a/présentation1.pptx
+++ b/présentation1.pptx
@@ -4,6 +4,9 @@
   <p:sldMasterIdLst>
     <p:sldMasterId id="2147483696" r:id="rId1"/>
   </p:sldMasterIdLst>
+  <p:notesMasterIdLst>
+    <p:notesMasterId r:id="rId14"/>
+  </p:notesMasterIdLst>
   <p:sldIdLst>
     <p:sldId id="256" r:id="rId2"/>
     <p:sldId id="257" r:id="rId3"/>
@@ -16,7 +19,7 @@
     <p:sldId id="265" r:id="rId10"/>
     <p:sldId id="266" r:id="rId11"/>
     <p:sldId id="267" r:id="rId12"/>
-    <p:sldId id="261" r:id="rId13"/>
+    <p:sldId id="268" r:id="rId13"/>
   </p:sldIdLst>
   <p:sldSz cx="12192000" cy="6858000"/>
   <p:notesSz cx="6858000" cy="9144000"/>
@@ -115,7 +118,1823 @@
       </a:defRPr>
     </a:lvl9pPr>
   </p:defaultTextStyle>
+  <p:extLst>
+    <p:ext uri="{EFAFB233-063F-42B5-8137-9DF3F51BA10A}">
+      <p15:sldGuideLst xmlns:p15="http://schemas.microsoft.com/office/powerpoint/2012/main"/>
+    </p:ext>
+  </p:extLst>
 </p:presentation>
+</file>
+
+<file path=ppt/notesMasters/notesMaster1.xml><?xml version="1.0" encoding="utf-8"?>
+<p:notesMaster xmlns:a="http://schemas.openxmlformats.org/drawingml/2006/main" xmlns:r="http://schemas.openxmlformats.org/officeDocument/2006/relationships" xmlns:p="http://schemas.openxmlformats.org/presentationml/2006/main">
+  <p:cSld>
+    <p:bg>
+      <p:bgRef idx="1001">
+        <a:schemeClr val="bg1"/>
+      </p:bgRef>
+    </p:bg>
+    <p:spTree>
+      <p:nvGrpSpPr>
+        <p:cNvPr id="1" name=""/>
+        <p:cNvGrpSpPr/>
+        <p:nvPr/>
+      </p:nvGrpSpPr>
+      <p:grpSpPr>
+        <a:xfrm>
+          <a:off x="0" y="0"/>
+          <a:ext cx="0" cy="0"/>
+          <a:chOff x="0" y="0"/>
+          <a:chExt cx="0" cy="0"/>
+        </a:xfrm>
+      </p:grpSpPr>
+      <p:sp>
+        <p:nvSpPr>
+          <p:cNvPr id="2" name="Espace réservé de l'en-tête 1"/>
+          <p:cNvSpPr>
+            <a:spLocks noGrp="1"/>
+          </p:cNvSpPr>
+          <p:nvPr>
+            <p:ph type="hdr" sz="quarter"/>
+          </p:nvPr>
+        </p:nvSpPr>
+        <p:spPr>
+          <a:xfrm>
+            <a:off x="0" y="0"/>
+            <a:ext cx="2971800" cy="458788"/>
+          </a:xfrm>
+          <a:prstGeom prst="rect">
+            <a:avLst/>
+          </a:prstGeom>
+        </p:spPr>
+        <p:txBody>
+          <a:bodyPr vert="horz" lIns="91440" tIns="45720" rIns="91440" bIns="45720" rtlCol="0"/>
+          <a:lstStyle>
+            <a:lvl1pPr algn="l">
+              <a:defRPr sz="1200"/>
+            </a:lvl1pPr>
+          </a:lstStyle>
+          <a:p>
+            <a:endParaRPr lang="en-US"/>
+          </a:p>
+        </p:txBody>
+      </p:sp>
+      <p:sp>
+        <p:nvSpPr>
+          <p:cNvPr id="3" name="Espace réservé de la date 2"/>
+          <p:cNvSpPr>
+            <a:spLocks noGrp="1"/>
+          </p:cNvSpPr>
+          <p:nvPr>
+            <p:ph type="dt" idx="1"/>
+          </p:nvPr>
+        </p:nvSpPr>
+        <p:spPr>
+          <a:xfrm>
+            <a:off x="3884613" y="0"/>
+            <a:ext cx="2971800" cy="458788"/>
+          </a:xfrm>
+          <a:prstGeom prst="rect">
+            <a:avLst/>
+          </a:prstGeom>
+        </p:spPr>
+        <p:txBody>
+          <a:bodyPr vert="horz" lIns="91440" tIns="45720" rIns="91440" bIns="45720" rtlCol="0"/>
+          <a:lstStyle>
+            <a:lvl1pPr algn="r">
+              <a:defRPr sz="1200"/>
+            </a:lvl1pPr>
+          </a:lstStyle>
+          <a:p>
+            <a:fld id="{C517DC7F-B3D4-41A4-BDBD-764372463866}" type="datetimeFigureOut">
+              <a:rPr lang="en-US" smtClean="0"/>
+              <a:t>8/8/2025</a:t>
+            </a:fld>
+            <a:endParaRPr lang="en-US"/>
+          </a:p>
+        </p:txBody>
+      </p:sp>
+      <p:sp>
+        <p:nvSpPr>
+          <p:cNvPr id="4" name="Espace réservé de l'image des diapositives 3"/>
+          <p:cNvSpPr>
+            <a:spLocks noGrp="1" noRot="1" noChangeAspect="1"/>
+          </p:cNvSpPr>
+          <p:nvPr>
+            <p:ph type="sldImg" idx="2"/>
+          </p:nvPr>
+        </p:nvSpPr>
+        <p:spPr>
+          <a:xfrm>
+            <a:off x="685800" y="1143000"/>
+            <a:ext cx="5486400" cy="3086100"/>
+          </a:xfrm>
+          <a:prstGeom prst="rect">
+            <a:avLst/>
+          </a:prstGeom>
+          <a:noFill/>
+          <a:ln w="12700">
+            <a:solidFill>
+              <a:prstClr val="black"/>
+            </a:solidFill>
+          </a:ln>
+        </p:spPr>
+        <p:txBody>
+          <a:bodyPr vert="horz" lIns="91440" tIns="45720" rIns="91440" bIns="45720" rtlCol="0" anchor="ctr"/>
+          <a:lstStyle/>
+          <a:p>
+            <a:endParaRPr lang="en-US"/>
+          </a:p>
+        </p:txBody>
+      </p:sp>
+      <p:sp>
+        <p:nvSpPr>
+          <p:cNvPr id="5" name="Espace réservé des notes 4"/>
+          <p:cNvSpPr>
+            <a:spLocks noGrp="1"/>
+          </p:cNvSpPr>
+          <p:nvPr>
+            <p:ph type="body" sz="quarter" idx="3"/>
+          </p:nvPr>
+        </p:nvSpPr>
+        <p:spPr>
+          <a:xfrm>
+            <a:off x="685800" y="4400550"/>
+            <a:ext cx="5486400" cy="3600450"/>
+          </a:xfrm>
+          <a:prstGeom prst="rect">
+            <a:avLst/>
+          </a:prstGeom>
+        </p:spPr>
+        <p:txBody>
+          <a:bodyPr vert="horz" lIns="91440" tIns="45720" rIns="91440" bIns="45720" rtlCol="0"/>
+          <a:lstStyle/>
+          <a:p>
+            <a:pPr lvl="0"/>
+            <a:r>
+              <a:rPr lang="fr-FR" smtClean="0"/>
+              <a:t>Modifier les styles du texte du masque</a:t>
+            </a:r>
+          </a:p>
+          <a:p>
+            <a:pPr lvl="1"/>
+            <a:r>
+              <a:rPr lang="fr-FR" smtClean="0"/>
+              <a:t>Deuxième niveau</a:t>
+            </a:r>
+          </a:p>
+          <a:p>
+            <a:pPr lvl="2"/>
+            <a:r>
+              <a:rPr lang="fr-FR" smtClean="0"/>
+              <a:t>Troisième niveau</a:t>
+            </a:r>
+          </a:p>
+          <a:p>
+            <a:pPr lvl="3"/>
+            <a:r>
+              <a:rPr lang="fr-FR" smtClean="0"/>
+              <a:t>Quatrième niveau</a:t>
+            </a:r>
+          </a:p>
+          <a:p>
+            <a:pPr lvl="4"/>
+            <a:r>
+              <a:rPr lang="fr-FR" smtClean="0"/>
+              <a:t>Cinquième niveau</a:t>
+            </a:r>
+            <a:endParaRPr lang="en-US"/>
+          </a:p>
+        </p:txBody>
+      </p:sp>
+      <p:sp>
+        <p:nvSpPr>
+          <p:cNvPr id="6" name="Espace réservé du pied de page 5"/>
+          <p:cNvSpPr>
+            <a:spLocks noGrp="1"/>
+          </p:cNvSpPr>
+          <p:nvPr>
+            <p:ph type="ftr" sz="quarter" idx="4"/>
+          </p:nvPr>
+        </p:nvSpPr>
+        <p:spPr>
+          <a:xfrm>
+            <a:off x="0" y="8685213"/>
+            <a:ext cx="2971800" cy="458787"/>
+          </a:xfrm>
+          <a:prstGeom prst="rect">
+            <a:avLst/>
+          </a:prstGeom>
+        </p:spPr>
+        <p:txBody>
+          <a:bodyPr vert="horz" lIns="91440" tIns="45720" rIns="91440" bIns="45720" rtlCol="0" anchor="b"/>
+          <a:lstStyle>
+            <a:lvl1pPr algn="l">
+              <a:defRPr sz="1200"/>
+            </a:lvl1pPr>
+          </a:lstStyle>
+          <a:p>
+            <a:endParaRPr lang="en-US"/>
+          </a:p>
+        </p:txBody>
+      </p:sp>
+      <p:sp>
+        <p:nvSpPr>
+          <p:cNvPr id="7" name="Espace réservé du numéro de diapositive 6"/>
+          <p:cNvSpPr>
+            <a:spLocks noGrp="1"/>
+          </p:cNvSpPr>
+          <p:nvPr>
+            <p:ph type="sldNum" sz="quarter" idx="5"/>
+          </p:nvPr>
+        </p:nvSpPr>
+        <p:spPr>
+          <a:xfrm>
+            <a:off x="3884613" y="8685213"/>
+            <a:ext cx="2971800" cy="458787"/>
+          </a:xfrm>
+          <a:prstGeom prst="rect">
+            <a:avLst/>
+          </a:prstGeom>
+        </p:spPr>
+        <p:txBody>
+          <a:bodyPr vert="horz" lIns="91440" tIns="45720" rIns="91440" bIns="45720" rtlCol="0" anchor="b"/>
+          <a:lstStyle>
+            <a:lvl1pPr algn="r">
+              <a:defRPr sz="1200"/>
+            </a:lvl1pPr>
+          </a:lstStyle>
+          <a:p>
+            <a:fld id="{9EB718E3-4971-4414-9710-CD5B1E03284D}" type="slidenum">
+              <a:rPr lang="en-US" smtClean="0"/>
+              <a:t>‹N°›</a:t>
+            </a:fld>
+            <a:endParaRPr lang="en-US"/>
+          </a:p>
+        </p:txBody>
+      </p:sp>
+    </p:spTree>
+    <p:extLst>
+      <p:ext uri="{BB962C8B-B14F-4D97-AF65-F5344CB8AC3E}">
+        <p14:creationId xmlns:p14="http://schemas.microsoft.com/office/powerpoint/2010/main" val="351228840"/>
+      </p:ext>
+    </p:extLst>
+  </p:cSld>
+  <p:clrMap bg1="lt1" tx1="dk1" bg2="lt2" tx2="dk2" accent1="accent1" accent2="accent2" accent3="accent3" accent4="accent4" accent5="accent5" accent6="accent6" hlink="hlink" folHlink="folHlink"/>
+  <p:notesStyle>
+    <a:lvl1pPr marL="0" algn="l" defTabSz="914400" rtl="0" eaLnBrk="1" latinLnBrk="0" hangingPunct="1">
+      <a:defRPr sz="1200" kern="1200">
+        <a:solidFill>
+          <a:schemeClr val="tx1"/>
+        </a:solidFill>
+        <a:latin typeface="+mn-lt"/>
+        <a:ea typeface="+mn-ea"/>
+        <a:cs typeface="+mn-cs"/>
+      </a:defRPr>
+    </a:lvl1pPr>
+    <a:lvl2pPr marL="457200" algn="l" defTabSz="914400" rtl="0" eaLnBrk="1" latinLnBrk="0" hangingPunct="1">
+      <a:defRPr sz="1200" kern="1200">
+        <a:solidFill>
+          <a:schemeClr val="tx1"/>
+        </a:solidFill>
+        <a:latin typeface="+mn-lt"/>
+        <a:ea typeface="+mn-ea"/>
+        <a:cs typeface="+mn-cs"/>
+      </a:defRPr>
+    </a:lvl2pPr>
+    <a:lvl3pPr marL="914400" algn="l" defTabSz="914400" rtl="0" eaLnBrk="1" latinLnBrk="0" hangingPunct="1">
+      <a:defRPr sz="1200" kern="1200">
+        <a:solidFill>
+          <a:schemeClr val="tx1"/>
+        </a:solidFill>
+        <a:latin typeface="+mn-lt"/>
+        <a:ea typeface="+mn-ea"/>
+        <a:cs typeface="+mn-cs"/>
+      </a:defRPr>
+    </a:lvl3pPr>
+    <a:lvl4pPr marL="1371600" algn="l" defTabSz="914400" rtl="0" eaLnBrk="1" latinLnBrk="0" hangingPunct="1">
+      <a:defRPr sz="1200" kern="1200">
+        <a:solidFill>
+          <a:schemeClr val="tx1"/>
+        </a:solidFill>
+        <a:latin typeface="+mn-lt"/>
+        <a:ea typeface="+mn-ea"/>
+        <a:cs typeface="+mn-cs"/>
+      </a:defRPr>
+    </a:lvl4pPr>
+    <a:lvl5pPr marL="1828800" algn="l" defTabSz="914400" rtl="0" eaLnBrk="1" latinLnBrk="0" hangingPunct="1">
+      <a:defRPr sz="1200" kern="1200">
+        <a:solidFill>
+          <a:schemeClr val="tx1"/>
+        </a:solidFill>
+        <a:latin typeface="+mn-lt"/>
+        <a:ea typeface="+mn-ea"/>
+        <a:cs typeface="+mn-cs"/>
+      </a:defRPr>
+    </a:lvl5pPr>
+    <a:lvl6pPr marL="2286000" algn="l" defTabSz="914400" rtl="0" eaLnBrk="1" latinLnBrk="0" hangingPunct="1">
+      <a:defRPr sz="1200" kern="1200">
+        <a:solidFill>
+          <a:schemeClr val="tx1"/>
+        </a:solidFill>
+        <a:latin typeface="+mn-lt"/>
+        <a:ea typeface="+mn-ea"/>
+        <a:cs typeface="+mn-cs"/>
+      </a:defRPr>
+    </a:lvl6pPr>
+    <a:lvl7pPr marL="2743200" algn="l" defTabSz="914400" rtl="0" eaLnBrk="1" latinLnBrk="0" hangingPunct="1">
+      <a:defRPr sz="1200" kern="1200">
+        <a:solidFill>
+          <a:schemeClr val="tx1"/>
+        </a:solidFill>
+        <a:latin typeface="+mn-lt"/>
+        <a:ea typeface="+mn-ea"/>
+        <a:cs typeface="+mn-cs"/>
+      </a:defRPr>
+    </a:lvl7pPr>
+    <a:lvl8pPr marL="3200400" algn="l" defTabSz="914400" rtl="0" eaLnBrk="1" latinLnBrk="0" hangingPunct="1">
+      <a:defRPr sz="1200" kern="1200">
+        <a:solidFill>
+          <a:schemeClr val="tx1"/>
+        </a:solidFill>
+        <a:latin typeface="+mn-lt"/>
+        <a:ea typeface="+mn-ea"/>
+        <a:cs typeface="+mn-cs"/>
+      </a:defRPr>
+    </a:lvl8pPr>
+    <a:lvl9pPr marL="3657600" algn="l" defTabSz="914400" rtl="0" eaLnBrk="1" latinLnBrk="0" hangingPunct="1">
+      <a:defRPr sz="1200" kern="1200">
+        <a:solidFill>
+          <a:schemeClr val="tx1"/>
+        </a:solidFill>
+        <a:latin typeface="+mn-lt"/>
+        <a:ea typeface="+mn-ea"/>
+        <a:cs typeface="+mn-cs"/>
+      </a:defRPr>
+    </a:lvl9pPr>
+  </p:notesStyle>
+</p:notesMaster>
+</file>
+
+<file path=ppt/notesSlides/notesSlide1.xml><?xml version="1.0" encoding="utf-8"?>
+<p:notes xmlns:a="http://schemas.openxmlformats.org/drawingml/2006/main" xmlns:r="http://schemas.openxmlformats.org/officeDocument/2006/relationships" xmlns:p="http://schemas.openxmlformats.org/presentationml/2006/main">
+  <p:cSld>
+    <p:spTree>
+      <p:nvGrpSpPr>
+        <p:cNvPr id="1" name=""/>
+        <p:cNvGrpSpPr/>
+        <p:nvPr/>
+      </p:nvGrpSpPr>
+      <p:grpSpPr>
+        <a:xfrm>
+          <a:off x="0" y="0"/>
+          <a:ext cx="0" cy="0"/>
+          <a:chOff x="0" y="0"/>
+          <a:chExt cx="0" cy="0"/>
+        </a:xfrm>
+      </p:grpSpPr>
+      <p:sp>
+        <p:nvSpPr>
+          <p:cNvPr id="2" name="Espace réservé de l'image des diapositives 1"/>
+          <p:cNvSpPr>
+            <a:spLocks noGrp="1" noRot="1" noChangeAspect="1"/>
+          </p:cNvSpPr>
+          <p:nvPr>
+            <p:ph type="sldImg"/>
+          </p:nvPr>
+        </p:nvSpPr>
+        <p:spPr/>
+      </p:sp>
+      <p:sp>
+        <p:nvSpPr>
+          <p:cNvPr id="3" name="Espace réservé des notes 2"/>
+          <p:cNvSpPr>
+            <a:spLocks noGrp="1"/>
+          </p:cNvSpPr>
+          <p:nvPr>
+            <p:ph type="body" idx="1"/>
+          </p:nvPr>
+        </p:nvSpPr>
+        <p:spPr/>
+        <p:txBody>
+          <a:bodyPr/>
+          <a:lstStyle/>
+          <a:p>
+            <a:r>
+              <a:rPr lang="fr-CM" dirty="0" smtClean="0"/>
+              <a:t>Scientifique :</a:t>
+            </a:r>
+          </a:p>
+          <a:p>
+            <a:r>
+              <a:rPr lang="fr-CM" sz="1200" kern="1200" dirty="0" smtClean="0">
+                <a:solidFill>
+                  <a:schemeClr val="tx1"/>
+                </a:solidFill>
+                <a:effectLst/>
+                <a:latin typeface="+mn-lt"/>
+                <a:ea typeface="+mn-ea"/>
+                <a:cs typeface="+mn-cs"/>
+              </a:rPr>
+              <a:t>permettre d’anticiper des tendances dans l’utilisation des ressources hospitalières, la gestion des stocks pharmaceutiques, ou encore le taux d’occupation des services.</a:t>
+            </a:r>
+          </a:p>
+          <a:p>
+            <a:endParaRPr lang="fr-CM" sz="1200" kern="1200" dirty="0" smtClean="0">
+              <a:solidFill>
+                <a:schemeClr val="tx1"/>
+              </a:solidFill>
+              <a:effectLst/>
+              <a:latin typeface="+mn-lt"/>
+              <a:ea typeface="+mn-ea"/>
+              <a:cs typeface="+mn-cs"/>
+            </a:endParaRPr>
+          </a:p>
+          <a:p>
+            <a:r>
+              <a:rPr lang="fr-CM" sz="1200" kern="1200" dirty="0" smtClean="0">
+                <a:solidFill>
+                  <a:schemeClr val="tx1"/>
+                </a:solidFill>
+                <a:effectLst/>
+                <a:latin typeface="+mn-lt"/>
+                <a:ea typeface="+mn-ea"/>
+                <a:cs typeface="+mn-cs"/>
+              </a:rPr>
+              <a:t>Pratique :</a:t>
+            </a:r>
+          </a:p>
+          <a:p>
+            <a:pPr marL="171450" indent="-171450">
+              <a:buFontTx/>
+              <a:buChar char="-"/>
+            </a:pPr>
+            <a:r>
+              <a:rPr lang="fr-CM" sz="1200" kern="1200" dirty="0" smtClean="0">
+                <a:solidFill>
+                  <a:schemeClr val="tx1"/>
+                </a:solidFill>
+                <a:effectLst/>
+                <a:latin typeface="+mn-lt"/>
+                <a:ea typeface="+mn-ea"/>
+                <a:cs typeface="+mn-cs"/>
+              </a:rPr>
+              <a:t>Offrir des </a:t>
+            </a:r>
+            <a:r>
+              <a:rPr lang="fr-CM" sz="1200" b="1" kern="1200" dirty="0" smtClean="0">
+                <a:solidFill>
+                  <a:schemeClr val="tx1"/>
+                </a:solidFill>
+                <a:effectLst/>
+                <a:latin typeface="+mn-lt"/>
+                <a:ea typeface="+mn-ea"/>
+                <a:cs typeface="+mn-cs"/>
+              </a:rPr>
+              <a:t>prédictions automatisées</a:t>
+            </a:r>
+          </a:p>
+          <a:p>
+            <a:pPr marL="171450" indent="-171450">
+              <a:buFontTx/>
+              <a:buChar char="-"/>
+            </a:pPr>
+            <a:r>
+              <a:rPr lang="fr-CM" sz="1200" kern="1200" dirty="0" smtClean="0">
+                <a:solidFill>
+                  <a:schemeClr val="tx1"/>
+                </a:solidFill>
+                <a:effectLst/>
+                <a:latin typeface="+mn-lt"/>
+                <a:ea typeface="+mn-ea"/>
+                <a:cs typeface="+mn-cs"/>
+              </a:rPr>
+              <a:t>Simplifiant la navigation à l’aide d’un </a:t>
+            </a:r>
+            <a:r>
+              <a:rPr lang="fr-CM" sz="1200" b="1" kern="1200" dirty="0" smtClean="0">
+                <a:solidFill>
+                  <a:schemeClr val="tx1"/>
+                </a:solidFill>
+                <a:effectLst/>
+                <a:latin typeface="+mn-lt"/>
+                <a:ea typeface="+mn-ea"/>
+                <a:cs typeface="+mn-cs"/>
+              </a:rPr>
+              <a:t>chatbot vocal et</a:t>
+            </a:r>
+            <a:r>
+              <a:rPr lang="fr-CM" sz="1200" b="1" kern="1200" baseline="0" dirty="0" smtClean="0">
+                <a:solidFill>
+                  <a:schemeClr val="tx1"/>
+                </a:solidFill>
+                <a:effectLst/>
+                <a:latin typeface="+mn-lt"/>
+                <a:ea typeface="+mn-ea"/>
+                <a:cs typeface="+mn-cs"/>
+              </a:rPr>
+              <a:t> textuel </a:t>
+            </a:r>
+            <a:r>
+              <a:rPr lang="fr-CM" sz="1200" b="1" kern="1200" dirty="0" smtClean="0">
+                <a:solidFill>
+                  <a:schemeClr val="tx1"/>
+                </a:solidFill>
+                <a:effectLst/>
+                <a:latin typeface="+mn-lt"/>
+                <a:ea typeface="+mn-ea"/>
+                <a:cs typeface="+mn-cs"/>
+              </a:rPr>
+              <a:t>intelligent</a:t>
+            </a:r>
+            <a:r>
+              <a:rPr lang="fr-CM" sz="1200" kern="1200" dirty="0" smtClean="0">
+                <a:solidFill>
+                  <a:schemeClr val="tx1"/>
+                </a:solidFill>
+                <a:effectLst/>
+                <a:latin typeface="+mn-lt"/>
+                <a:ea typeface="+mn-ea"/>
+                <a:cs typeface="+mn-cs"/>
+              </a:rPr>
+              <a:t>,</a:t>
+            </a:r>
+          </a:p>
+          <a:p>
+            <a:pPr marL="171450" indent="-171450">
+              <a:buFontTx/>
+              <a:buChar char="-"/>
+            </a:pPr>
+            <a:endParaRPr lang="fr-CM" sz="1200" kern="1200" dirty="0" smtClean="0">
+              <a:solidFill>
+                <a:schemeClr val="tx1"/>
+              </a:solidFill>
+              <a:effectLst/>
+              <a:latin typeface="+mn-lt"/>
+              <a:ea typeface="+mn-ea"/>
+              <a:cs typeface="+mn-cs"/>
+            </a:endParaRPr>
+          </a:p>
+          <a:p>
+            <a:pPr marL="0" indent="0">
+              <a:buFontTx/>
+              <a:buNone/>
+            </a:pPr>
+            <a:r>
+              <a:rPr lang="fr-CM" sz="1200" kern="1200" dirty="0" smtClean="0">
+                <a:solidFill>
+                  <a:schemeClr val="tx1"/>
+                </a:solidFill>
+                <a:effectLst/>
+                <a:latin typeface="+mn-lt"/>
+                <a:ea typeface="+mn-ea"/>
+                <a:cs typeface="+mn-cs"/>
+              </a:rPr>
+              <a:t>Economique</a:t>
+            </a:r>
+            <a:r>
+              <a:rPr lang="fr-CM" sz="1200" kern="1200" baseline="0" dirty="0" smtClean="0">
+                <a:solidFill>
+                  <a:schemeClr val="tx1"/>
+                </a:solidFill>
+                <a:effectLst/>
+                <a:latin typeface="+mn-lt"/>
+                <a:ea typeface="+mn-ea"/>
+                <a:cs typeface="+mn-cs"/>
+              </a:rPr>
+              <a:t> :</a:t>
+            </a:r>
+          </a:p>
+          <a:p>
+            <a:pPr marL="171450" indent="-171450">
+              <a:buFontTx/>
+              <a:buChar char="-"/>
+            </a:pPr>
+            <a:r>
+              <a:rPr lang="fr-CM" sz="1200" kern="1200" dirty="0" smtClean="0">
+                <a:solidFill>
+                  <a:schemeClr val="tx1"/>
+                </a:solidFill>
+                <a:effectLst/>
+                <a:latin typeface="+mn-lt"/>
+                <a:ea typeface="+mn-ea"/>
+                <a:cs typeface="+mn-cs"/>
+              </a:rPr>
+              <a:t>Réduction des coûts liés aux erreurs humaines ou à la mauvaise planification des ressources</a:t>
+            </a:r>
+          </a:p>
+          <a:p>
+            <a:pPr marL="171450" indent="-171450">
+              <a:buFontTx/>
+              <a:buChar char="-"/>
+            </a:pPr>
+            <a:r>
+              <a:rPr lang="fr-CM" sz="1200" kern="1200" dirty="0" smtClean="0">
+                <a:solidFill>
+                  <a:schemeClr val="tx1"/>
+                </a:solidFill>
+                <a:effectLst/>
+                <a:latin typeface="+mn-lt"/>
+                <a:ea typeface="+mn-ea"/>
+                <a:cs typeface="+mn-cs"/>
+              </a:rPr>
+              <a:t>Amélioration de la gestion des flux, des achats, des stocks et du personnel grâce à des </a:t>
+            </a:r>
+            <a:r>
+              <a:rPr lang="fr-CM" sz="1200" b="1" kern="1200" dirty="0" smtClean="0">
+                <a:solidFill>
+                  <a:schemeClr val="tx1"/>
+                </a:solidFill>
+                <a:effectLst/>
+                <a:latin typeface="+mn-lt"/>
+                <a:ea typeface="+mn-ea"/>
+                <a:cs typeface="+mn-cs"/>
+              </a:rPr>
+              <a:t>modèles prédictifs optimisant la planification</a:t>
+            </a:r>
+          </a:p>
+          <a:p>
+            <a:pPr marL="171450" indent="-171450">
+              <a:buFontTx/>
+              <a:buChar char="-"/>
+            </a:pPr>
+            <a:r>
+              <a:rPr lang="fr-CM" sz="1200" kern="1200" dirty="0" smtClean="0">
+                <a:solidFill>
+                  <a:schemeClr val="tx1"/>
+                </a:solidFill>
+                <a:effectLst/>
+                <a:latin typeface="+mn-lt"/>
+                <a:ea typeface="+mn-ea"/>
+                <a:cs typeface="+mn-cs"/>
+              </a:rPr>
+              <a:t>Limitation des dépenses liées à la formation grâce à une </a:t>
+            </a:r>
+            <a:r>
+              <a:rPr lang="fr-CM" sz="1200" b="1" kern="1200" dirty="0" smtClean="0">
+                <a:solidFill>
+                  <a:schemeClr val="tx1"/>
+                </a:solidFill>
+                <a:effectLst/>
+                <a:latin typeface="+mn-lt"/>
+                <a:ea typeface="+mn-ea"/>
+                <a:cs typeface="+mn-cs"/>
+              </a:rPr>
+              <a:t>interface utilisateur guidée et intelligente</a:t>
+            </a:r>
+          </a:p>
+          <a:p>
+            <a:pPr marL="171450" indent="-171450">
+              <a:buFontTx/>
+              <a:buChar char="-"/>
+            </a:pPr>
+            <a:endParaRPr lang="fr-CM" sz="1200" b="1" kern="1200" dirty="0" smtClean="0">
+              <a:solidFill>
+                <a:schemeClr val="tx1"/>
+              </a:solidFill>
+              <a:effectLst/>
+              <a:latin typeface="+mn-lt"/>
+              <a:ea typeface="+mn-ea"/>
+              <a:cs typeface="+mn-cs"/>
+            </a:endParaRPr>
+          </a:p>
+          <a:p>
+            <a:pPr marL="0" indent="0">
+              <a:buFontTx/>
+              <a:buNone/>
+            </a:pPr>
+            <a:r>
+              <a:rPr lang="fr-CM" sz="1200" b="0" kern="1200" dirty="0" smtClean="0">
+                <a:solidFill>
+                  <a:schemeClr val="tx1"/>
+                </a:solidFill>
+                <a:effectLst/>
+                <a:latin typeface="+mn-lt"/>
+                <a:ea typeface="+mn-ea"/>
+                <a:cs typeface="+mn-cs"/>
+              </a:rPr>
+              <a:t>Pédagogique</a:t>
+            </a:r>
+            <a:r>
+              <a:rPr lang="fr-CM" sz="1200" b="0" kern="1200" baseline="0" dirty="0" smtClean="0">
+                <a:solidFill>
+                  <a:schemeClr val="tx1"/>
+                </a:solidFill>
+                <a:effectLst/>
+                <a:latin typeface="+mn-lt"/>
+                <a:ea typeface="+mn-ea"/>
+                <a:cs typeface="+mn-cs"/>
+              </a:rPr>
+              <a:t> :</a:t>
+            </a:r>
+          </a:p>
+          <a:p>
+            <a:pPr marL="0" marR="0" lvl="0" indent="0" algn="l" defTabSz="914400" rtl="0" eaLnBrk="1" fontAlgn="auto" latinLnBrk="0" hangingPunct="1">
+              <a:lnSpc>
+                <a:spcPct val="100000"/>
+              </a:lnSpc>
+              <a:spcBef>
+                <a:spcPts val="0"/>
+              </a:spcBef>
+              <a:spcAft>
+                <a:spcPts val="0"/>
+              </a:spcAft>
+              <a:buClrTx/>
+              <a:buSzTx/>
+              <a:buFontTx/>
+              <a:buNone/>
+              <a:tabLst/>
+              <a:defRPr/>
+            </a:pPr>
+            <a:r>
+              <a:rPr lang="fr-CM" sz="1200" b="0" kern="1200" baseline="0" dirty="0" smtClean="0">
+                <a:solidFill>
+                  <a:schemeClr val="tx1"/>
+                </a:solidFill>
+                <a:effectLst/>
+                <a:latin typeface="+mn-lt"/>
+                <a:ea typeface="+mn-ea"/>
+                <a:cs typeface="+mn-cs"/>
+              </a:rPr>
+              <a:t>- </a:t>
+            </a:r>
+            <a:r>
+              <a:rPr lang="fr-CM" sz="1200" kern="1200" dirty="0" smtClean="0">
+                <a:solidFill>
+                  <a:schemeClr val="tx1"/>
+                </a:solidFill>
+                <a:effectLst/>
+                <a:latin typeface="+mn-lt"/>
+                <a:ea typeface="+mn-ea"/>
+                <a:cs typeface="+mn-cs"/>
+              </a:rPr>
+              <a:t>Les techniques avancées de Machine/Deep Learning appliquées à des environnements réels.</a:t>
+            </a:r>
+            <a:endParaRPr lang="en-US" sz="1200" kern="1200" dirty="0" smtClean="0">
+              <a:solidFill>
+                <a:schemeClr val="tx1"/>
+              </a:solidFill>
+              <a:effectLst/>
+              <a:latin typeface="+mn-lt"/>
+              <a:ea typeface="+mn-ea"/>
+              <a:cs typeface="+mn-cs"/>
+            </a:endParaRPr>
+          </a:p>
+          <a:p>
+            <a:pPr marL="0" marR="0" lvl="0" indent="0" algn="l" defTabSz="914400" rtl="0" eaLnBrk="1" fontAlgn="auto" latinLnBrk="0" hangingPunct="1">
+              <a:lnSpc>
+                <a:spcPct val="100000"/>
+              </a:lnSpc>
+              <a:spcBef>
+                <a:spcPts val="0"/>
+              </a:spcBef>
+              <a:spcAft>
+                <a:spcPts val="0"/>
+              </a:spcAft>
+              <a:buClrTx/>
+              <a:buSzTx/>
+              <a:buFontTx/>
+              <a:buNone/>
+              <a:tabLst/>
+              <a:defRPr/>
+            </a:pPr>
+            <a:r>
+              <a:rPr lang="fr-CM" sz="1200" b="0" kern="1200" dirty="0" smtClean="0">
+                <a:solidFill>
+                  <a:schemeClr val="tx1"/>
+                </a:solidFill>
+                <a:effectLst/>
+                <a:latin typeface="+mn-lt"/>
+                <a:ea typeface="+mn-ea"/>
+                <a:cs typeface="+mn-cs"/>
+              </a:rPr>
+              <a:t>- </a:t>
+            </a:r>
+            <a:r>
+              <a:rPr lang="fr-CM" sz="1200" kern="1200" dirty="0" smtClean="0">
+                <a:solidFill>
+                  <a:schemeClr val="tx1"/>
+                </a:solidFill>
+                <a:effectLst/>
+                <a:latin typeface="+mn-lt"/>
+                <a:ea typeface="+mn-ea"/>
+                <a:cs typeface="+mn-cs"/>
+              </a:rPr>
+              <a:t>L’architecture des ERP développés sous </a:t>
+            </a:r>
+            <a:r>
+              <a:rPr lang="fr-CM" sz="1200" kern="1200" dirty="0" err="1" smtClean="0">
+                <a:solidFill>
+                  <a:schemeClr val="tx1"/>
+                </a:solidFill>
+                <a:effectLst/>
+                <a:latin typeface="+mn-lt"/>
+                <a:ea typeface="+mn-ea"/>
+                <a:cs typeface="+mn-cs"/>
+              </a:rPr>
+              <a:t>Laravel</a:t>
+            </a:r>
+            <a:r>
+              <a:rPr lang="fr-CM" sz="1200" kern="1200" dirty="0" smtClean="0">
+                <a:solidFill>
+                  <a:schemeClr val="tx1"/>
+                </a:solidFill>
+                <a:effectLst/>
+                <a:latin typeface="+mn-lt"/>
+                <a:ea typeface="+mn-ea"/>
+                <a:cs typeface="+mn-cs"/>
+              </a:rPr>
+              <a:t>, et les défis d’intégration de l’IA dans ce contexte.</a:t>
+            </a:r>
+            <a:endParaRPr lang="en-US" sz="1200" kern="1200" dirty="0" smtClean="0">
+              <a:solidFill>
+                <a:schemeClr val="tx1"/>
+              </a:solidFill>
+              <a:effectLst/>
+              <a:latin typeface="+mn-lt"/>
+              <a:ea typeface="+mn-ea"/>
+              <a:cs typeface="+mn-cs"/>
+            </a:endParaRPr>
+          </a:p>
+          <a:p>
+            <a:pPr marL="171450" indent="-171450">
+              <a:buFontTx/>
+              <a:buChar char="-"/>
+            </a:pPr>
+            <a:r>
+              <a:rPr lang="fr-CM" sz="1200" kern="1200" dirty="0" smtClean="0">
+                <a:solidFill>
+                  <a:schemeClr val="tx1"/>
+                </a:solidFill>
+                <a:effectLst/>
+                <a:latin typeface="+mn-lt"/>
+                <a:ea typeface="+mn-ea"/>
+                <a:cs typeface="+mn-cs"/>
+              </a:rPr>
+              <a:t>L’interaction homme-machine à travers la </a:t>
+            </a:r>
+            <a:r>
+              <a:rPr lang="fr-CM" sz="1200" b="1" kern="1200" dirty="0" smtClean="0">
+                <a:solidFill>
+                  <a:schemeClr val="tx1"/>
+                </a:solidFill>
+                <a:effectLst/>
+                <a:latin typeface="+mn-lt"/>
+                <a:ea typeface="+mn-ea"/>
+                <a:cs typeface="+mn-cs"/>
+              </a:rPr>
+              <a:t>vocalisation des interfaces</a:t>
+            </a:r>
+            <a:r>
+              <a:rPr lang="fr-CM" sz="1200" kern="1200" dirty="0" smtClean="0">
+                <a:solidFill>
+                  <a:schemeClr val="tx1"/>
+                </a:solidFill>
+                <a:effectLst/>
+                <a:latin typeface="+mn-lt"/>
+                <a:ea typeface="+mn-ea"/>
+                <a:cs typeface="+mn-cs"/>
+              </a:rPr>
+              <a:t>, sujet encore peu exploité dans les contextes hospitaliers francophones.</a:t>
+            </a:r>
+          </a:p>
+          <a:p>
+            <a:pPr marL="171450" indent="-171450">
+              <a:buFontTx/>
+              <a:buChar char="-"/>
+            </a:pPr>
+            <a:endParaRPr lang="fr-CM" sz="1200" b="0" kern="1200" dirty="0" smtClean="0">
+              <a:solidFill>
+                <a:schemeClr val="tx1"/>
+              </a:solidFill>
+              <a:effectLst/>
+              <a:latin typeface="+mn-lt"/>
+              <a:ea typeface="+mn-ea"/>
+              <a:cs typeface="+mn-cs"/>
+            </a:endParaRPr>
+          </a:p>
+          <a:p>
+            <a:pPr marL="0" indent="0">
+              <a:buFontTx/>
+              <a:buNone/>
+            </a:pPr>
+            <a:r>
+              <a:rPr lang="fr-CM" sz="1200" b="0" kern="1200" dirty="0" smtClean="0">
+                <a:solidFill>
+                  <a:schemeClr val="tx1"/>
+                </a:solidFill>
+                <a:effectLst/>
+                <a:latin typeface="+mn-lt"/>
+                <a:ea typeface="+mn-ea"/>
+                <a:cs typeface="+mn-cs"/>
+              </a:rPr>
+              <a:t>Social :</a:t>
+            </a:r>
+          </a:p>
+          <a:p>
+            <a:pPr marL="171450" indent="-171450">
+              <a:buFontTx/>
+              <a:buChar char="-"/>
+            </a:pPr>
+            <a:r>
+              <a:rPr lang="fr-CM" sz="1200" kern="1200" dirty="0" smtClean="0">
+                <a:solidFill>
+                  <a:schemeClr val="tx1"/>
+                </a:solidFill>
+                <a:effectLst/>
+                <a:latin typeface="+mn-lt"/>
+                <a:ea typeface="+mn-ea"/>
+                <a:cs typeface="+mn-cs"/>
+              </a:rPr>
+              <a:t>L’</a:t>
+            </a:r>
+            <a:r>
+              <a:rPr lang="fr-CM" sz="1200" b="1" kern="1200" dirty="0" smtClean="0">
+                <a:solidFill>
+                  <a:schemeClr val="tx1"/>
+                </a:solidFill>
+                <a:effectLst/>
+                <a:latin typeface="+mn-lt"/>
+                <a:ea typeface="+mn-ea"/>
+                <a:cs typeface="+mn-cs"/>
+              </a:rPr>
+              <a:t>efficacité des soins</a:t>
+            </a:r>
+          </a:p>
+          <a:p>
+            <a:pPr marL="171450" indent="-171450">
+              <a:buFontTx/>
+              <a:buChar char="-"/>
+            </a:pPr>
+            <a:r>
+              <a:rPr lang="fr-CM" sz="1200" kern="1200" smtClean="0">
+                <a:solidFill>
+                  <a:schemeClr val="tx1"/>
+                </a:solidFill>
+                <a:effectLst/>
+                <a:latin typeface="+mn-lt"/>
+                <a:ea typeface="+mn-ea"/>
+                <a:cs typeface="+mn-cs"/>
+              </a:rPr>
+              <a:t>L’</a:t>
+            </a:r>
+            <a:r>
+              <a:rPr lang="fr-CM" sz="1200" b="1" kern="1200" smtClean="0">
+                <a:solidFill>
+                  <a:schemeClr val="tx1"/>
+                </a:solidFill>
+                <a:effectLst/>
+                <a:latin typeface="+mn-lt"/>
+                <a:ea typeface="+mn-ea"/>
+                <a:cs typeface="+mn-cs"/>
+              </a:rPr>
+              <a:t>accessibilité</a:t>
+            </a:r>
+            <a:r>
+              <a:rPr lang="fr-CM" sz="1200" kern="1200" smtClean="0">
+                <a:solidFill>
+                  <a:schemeClr val="tx1"/>
+                </a:solidFill>
+                <a:effectLst/>
+                <a:latin typeface="+mn-lt"/>
+                <a:ea typeface="+mn-ea"/>
+                <a:cs typeface="+mn-cs"/>
+              </a:rPr>
+              <a:t> des outils numériques</a:t>
+            </a:r>
+            <a:endParaRPr lang="fr-CM" sz="1200" b="0" kern="1200" dirty="0" smtClean="0">
+              <a:solidFill>
+                <a:schemeClr val="tx1"/>
+              </a:solidFill>
+              <a:effectLst/>
+              <a:latin typeface="+mn-lt"/>
+              <a:ea typeface="+mn-ea"/>
+              <a:cs typeface="+mn-cs"/>
+            </a:endParaRPr>
+          </a:p>
+        </p:txBody>
+      </p:sp>
+      <p:sp>
+        <p:nvSpPr>
+          <p:cNvPr id="4" name="Espace réservé du numéro de diapositive 3"/>
+          <p:cNvSpPr>
+            <a:spLocks noGrp="1"/>
+          </p:cNvSpPr>
+          <p:nvPr>
+            <p:ph type="sldNum" sz="quarter" idx="10"/>
+          </p:nvPr>
+        </p:nvSpPr>
+        <p:spPr/>
+        <p:txBody>
+          <a:bodyPr/>
+          <a:lstStyle/>
+          <a:p>
+            <a:fld id="{9EB718E3-4971-4414-9710-CD5B1E03284D}" type="slidenum">
+              <a:rPr lang="en-US" smtClean="0"/>
+              <a:t>11</a:t>
+            </a:fld>
+            <a:endParaRPr lang="en-US"/>
+          </a:p>
+        </p:txBody>
+      </p:sp>
+    </p:spTree>
+    <p:extLst>
+      <p:ext uri="{BB962C8B-B14F-4D97-AF65-F5344CB8AC3E}">
+        <p14:creationId xmlns:p14="http://schemas.microsoft.com/office/powerpoint/2010/main" val="1904535440"/>
+      </p:ext>
+    </p:extLst>
+  </p:cSld>
+  <p:clrMapOvr>
+    <a:masterClrMapping/>
+  </p:clrMapOvr>
+</p:notes>
+</file>
+
+<file path=ppt/notesSlides/notesSlide2.xml><?xml version="1.0" encoding="utf-8"?>
+<p:notes xmlns:a="http://schemas.openxmlformats.org/drawingml/2006/main" xmlns:r="http://schemas.openxmlformats.org/officeDocument/2006/relationships" xmlns:p="http://schemas.openxmlformats.org/presentationml/2006/main">
+  <p:cSld>
+    <p:spTree>
+      <p:nvGrpSpPr>
+        <p:cNvPr id="1" name=""/>
+        <p:cNvGrpSpPr/>
+        <p:nvPr/>
+      </p:nvGrpSpPr>
+      <p:grpSpPr>
+        <a:xfrm>
+          <a:off x="0" y="0"/>
+          <a:ext cx="0" cy="0"/>
+          <a:chOff x="0" y="0"/>
+          <a:chExt cx="0" cy="0"/>
+        </a:xfrm>
+      </p:grpSpPr>
+      <p:sp>
+        <p:nvSpPr>
+          <p:cNvPr id="2" name="Espace réservé de l'image des diapositives 1"/>
+          <p:cNvSpPr>
+            <a:spLocks noGrp="1" noRot="1" noChangeAspect="1"/>
+          </p:cNvSpPr>
+          <p:nvPr>
+            <p:ph type="sldImg"/>
+          </p:nvPr>
+        </p:nvSpPr>
+        <p:spPr/>
+      </p:sp>
+      <p:sp>
+        <p:nvSpPr>
+          <p:cNvPr id="3" name="Espace réservé des notes 2"/>
+          <p:cNvSpPr>
+            <a:spLocks noGrp="1"/>
+          </p:cNvSpPr>
+          <p:nvPr>
+            <p:ph type="body" idx="1"/>
+          </p:nvPr>
+        </p:nvSpPr>
+        <p:spPr/>
+        <p:txBody>
+          <a:bodyPr/>
+          <a:lstStyle/>
+          <a:p>
+            <a:pPr lvl="0"/>
+            <a:r>
+              <a:rPr lang="fr-CM" sz="1200" kern="1200" dirty="0" smtClean="0">
+                <a:solidFill>
+                  <a:schemeClr val="tx1"/>
+                </a:solidFill>
+                <a:effectLst/>
+                <a:latin typeface="+mn-lt"/>
+                <a:ea typeface="+mn-ea"/>
+                <a:cs typeface="+mn-cs"/>
+              </a:rPr>
+              <a:t>Thématique:</a:t>
+            </a:r>
+          </a:p>
+          <a:p>
+            <a:pPr lvl="0"/>
+            <a:r>
+              <a:rPr lang="fr-CM" sz="1200" kern="1200" dirty="0" smtClean="0">
+                <a:solidFill>
+                  <a:schemeClr val="tx1"/>
+                </a:solidFill>
+                <a:effectLst/>
+                <a:latin typeface="+mn-lt"/>
+                <a:ea typeface="+mn-ea"/>
+                <a:cs typeface="+mn-cs"/>
+              </a:rPr>
+              <a:t>- Faciliter l’utilisation de la plateforme via un </a:t>
+            </a:r>
+            <a:r>
+              <a:rPr lang="fr-CM" sz="1200" b="1" kern="1200" dirty="0" smtClean="0">
+                <a:solidFill>
+                  <a:schemeClr val="tx1"/>
+                </a:solidFill>
+                <a:effectLst/>
+                <a:latin typeface="+mn-lt"/>
+                <a:ea typeface="+mn-ea"/>
+                <a:cs typeface="+mn-cs"/>
+              </a:rPr>
+              <a:t>assistant vocal intelligent</a:t>
+            </a:r>
+            <a:r>
+              <a:rPr lang="fr-CM" sz="1200" kern="1200" dirty="0" smtClean="0">
+                <a:solidFill>
+                  <a:schemeClr val="tx1"/>
+                </a:solidFill>
+                <a:effectLst/>
+                <a:latin typeface="+mn-lt"/>
+                <a:ea typeface="+mn-ea"/>
+                <a:cs typeface="+mn-cs"/>
+              </a:rPr>
+              <a:t>,</a:t>
+            </a:r>
+            <a:endParaRPr lang="en-US" sz="1200" kern="1200" dirty="0" smtClean="0">
+              <a:solidFill>
+                <a:schemeClr val="tx1"/>
+              </a:solidFill>
+              <a:effectLst/>
+              <a:latin typeface="+mn-lt"/>
+              <a:ea typeface="+mn-ea"/>
+              <a:cs typeface="+mn-cs"/>
+            </a:endParaRPr>
+          </a:p>
+          <a:p>
+            <a:pPr lvl="0"/>
+            <a:r>
+              <a:rPr lang="fr-CM" sz="1200" kern="1200" dirty="0" smtClean="0">
+                <a:solidFill>
+                  <a:schemeClr val="tx1"/>
+                </a:solidFill>
+                <a:effectLst/>
+                <a:latin typeface="+mn-lt"/>
+                <a:ea typeface="+mn-ea"/>
+                <a:cs typeface="+mn-cs"/>
+              </a:rPr>
+              <a:t>- Assurer un </a:t>
+            </a:r>
+            <a:r>
+              <a:rPr lang="fr-CM" sz="1200" b="1" kern="1200" dirty="0" smtClean="0">
+                <a:solidFill>
+                  <a:schemeClr val="tx1"/>
+                </a:solidFill>
+                <a:effectLst/>
+                <a:latin typeface="+mn-lt"/>
+                <a:ea typeface="+mn-ea"/>
+                <a:cs typeface="+mn-cs"/>
+              </a:rPr>
+              <a:t>suivi des performances</a:t>
+            </a:r>
+            <a:r>
+              <a:rPr lang="fr-CM" sz="1200" kern="1200" dirty="0" smtClean="0">
+                <a:solidFill>
+                  <a:schemeClr val="tx1"/>
+                </a:solidFill>
+                <a:effectLst/>
+                <a:latin typeface="+mn-lt"/>
+                <a:ea typeface="+mn-ea"/>
+                <a:cs typeface="+mn-cs"/>
+              </a:rPr>
+              <a:t> des différents départements de l’établissement à travers des </a:t>
+            </a:r>
+            <a:r>
+              <a:rPr lang="fr-CM" sz="1200" b="1" kern="1200" dirty="0" smtClean="0">
+                <a:solidFill>
+                  <a:schemeClr val="tx1"/>
+                </a:solidFill>
+                <a:effectLst/>
+                <a:latin typeface="+mn-lt"/>
+                <a:ea typeface="+mn-ea"/>
+                <a:cs typeface="+mn-cs"/>
+              </a:rPr>
+              <a:t>Dashboard interactifs</a:t>
+            </a:r>
+            <a:r>
+              <a:rPr lang="fr-CM" sz="1200" kern="1200" dirty="0" smtClean="0">
+                <a:solidFill>
+                  <a:schemeClr val="tx1"/>
+                </a:solidFill>
+                <a:effectLst/>
+                <a:latin typeface="+mn-lt"/>
+                <a:ea typeface="+mn-ea"/>
+                <a:cs typeface="+mn-cs"/>
+              </a:rPr>
+              <a:t> et des </a:t>
+            </a:r>
+            <a:r>
+              <a:rPr lang="fr-CM" sz="1200" b="1" kern="1200" dirty="0" smtClean="0">
+                <a:solidFill>
+                  <a:schemeClr val="tx1"/>
+                </a:solidFill>
+                <a:effectLst/>
+                <a:latin typeface="+mn-lt"/>
+                <a:ea typeface="+mn-ea"/>
+                <a:cs typeface="+mn-cs"/>
+              </a:rPr>
+              <a:t>modèles prédictifs</a:t>
+            </a:r>
+            <a:r>
+              <a:rPr lang="fr-CM" sz="1200" kern="1200" dirty="0" smtClean="0">
+                <a:solidFill>
+                  <a:schemeClr val="tx1"/>
+                </a:solidFill>
+                <a:effectLst/>
+                <a:latin typeface="+mn-lt"/>
+                <a:ea typeface="+mn-ea"/>
+                <a:cs typeface="+mn-cs"/>
+              </a:rPr>
+              <a:t>.</a:t>
+            </a:r>
+            <a:endParaRPr lang="en-US" sz="1200" kern="1200" dirty="0" smtClean="0">
+              <a:solidFill>
+                <a:schemeClr val="tx1"/>
+              </a:solidFill>
+              <a:effectLst/>
+              <a:latin typeface="+mn-lt"/>
+              <a:ea typeface="+mn-ea"/>
+              <a:cs typeface="+mn-cs"/>
+            </a:endParaRPr>
+          </a:p>
+          <a:p>
+            <a:r>
+              <a:rPr lang="fr-CM" sz="1200" kern="1200" dirty="0" smtClean="0">
+                <a:solidFill>
+                  <a:schemeClr val="tx1"/>
+                </a:solidFill>
+                <a:effectLst/>
+                <a:latin typeface="+mn-lt"/>
+                <a:ea typeface="+mn-ea"/>
+                <a:cs typeface="+mn-cs"/>
+              </a:rPr>
+              <a:t>Elle n’a pas pour objectif de redéfinir l’architecture globale de l’ERP, ni d’élaborer l’intégralité de ses fonctionnalités de gestion hospitalière. L’accent est mis spécifiquement sur les </a:t>
+            </a:r>
+            <a:r>
+              <a:rPr lang="fr-CM" sz="1200" b="1" kern="1200" dirty="0" smtClean="0">
+                <a:solidFill>
+                  <a:schemeClr val="tx1"/>
+                </a:solidFill>
+                <a:effectLst/>
+                <a:latin typeface="+mn-lt"/>
+                <a:ea typeface="+mn-ea"/>
+                <a:cs typeface="+mn-cs"/>
+              </a:rPr>
+              <a:t>modules IA et analytique</a:t>
+            </a:r>
+            <a:r>
+              <a:rPr lang="fr-CM" sz="1200" kern="1200" dirty="0" smtClean="0">
+                <a:solidFill>
+                  <a:schemeClr val="tx1"/>
+                </a:solidFill>
+                <a:effectLst/>
+                <a:latin typeface="+mn-lt"/>
+                <a:ea typeface="+mn-ea"/>
+                <a:cs typeface="+mn-cs"/>
+              </a:rPr>
+              <a:t>.</a:t>
+            </a:r>
+          </a:p>
+          <a:p>
+            <a:endParaRPr lang="fr-CM" sz="1200" kern="1200" dirty="0" smtClean="0">
+              <a:solidFill>
+                <a:schemeClr val="tx1"/>
+              </a:solidFill>
+              <a:effectLst/>
+              <a:latin typeface="+mn-lt"/>
+              <a:ea typeface="+mn-ea"/>
+              <a:cs typeface="+mn-cs"/>
+            </a:endParaRPr>
+          </a:p>
+          <a:p>
+            <a:r>
+              <a:rPr lang="fr-CM" sz="1200" kern="1200" dirty="0" smtClean="0">
+                <a:solidFill>
+                  <a:schemeClr val="tx1"/>
+                </a:solidFill>
+                <a:effectLst/>
+                <a:latin typeface="+mn-lt"/>
+                <a:ea typeface="+mn-ea"/>
+                <a:cs typeface="+mn-cs"/>
+              </a:rPr>
+              <a:t>Spatio-temporelle</a:t>
+            </a:r>
+            <a:r>
+              <a:rPr lang="fr-CM" sz="1200" kern="1200" baseline="0" dirty="0" smtClean="0">
+                <a:solidFill>
+                  <a:schemeClr val="tx1"/>
+                </a:solidFill>
+                <a:effectLst/>
+                <a:latin typeface="+mn-lt"/>
+                <a:ea typeface="+mn-ea"/>
+                <a:cs typeface="+mn-cs"/>
+              </a:rPr>
+              <a:t> :</a:t>
+            </a:r>
+          </a:p>
+          <a:p>
+            <a:r>
+              <a:rPr lang="fr-CM" sz="1200" kern="1200" baseline="0" dirty="0" smtClean="0">
+                <a:solidFill>
+                  <a:schemeClr val="tx1"/>
+                </a:solidFill>
+                <a:effectLst/>
+                <a:latin typeface="+mn-lt"/>
+                <a:ea typeface="+mn-ea"/>
+                <a:cs typeface="+mn-cs"/>
+              </a:rPr>
+              <a:t>- </a:t>
+            </a:r>
+            <a:r>
+              <a:rPr lang="fr-CM" sz="1200" kern="1200" dirty="0" smtClean="0">
+                <a:solidFill>
+                  <a:schemeClr val="tx1"/>
+                </a:solidFill>
+                <a:effectLst/>
+                <a:latin typeface="+mn-lt"/>
+                <a:ea typeface="+mn-ea"/>
+                <a:cs typeface="+mn-cs"/>
+              </a:rPr>
+              <a:t>l’hôpital SAINTE THÉRÈSE sis à NGOUSSO Yaoundé</a:t>
+            </a:r>
+            <a:endParaRPr lang="fr-CM" sz="1200" kern="1200" baseline="0" dirty="0" smtClean="0">
+              <a:solidFill>
+                <a:schemeClr val="tx1"/>
+              </a:solidFill>
+              <a:effectLst/>
+              <a:latin typeface="+mn-lt"/>
+              <a:ea typeface="+mn-ea"/>
+              <a:cs typeface="+mn-cs"/>
+            </a:endParaRPr>
+          </a:p>
+          <a:p>
+            <a:pPr marL="171450" indent="-171450">
+              <a:buFontTx/>
+              <a:buChar char="-"/>
+            </a:pPr>
+            <a:r>
+              <a:rPr lang="fr-CM" sz="1200" kern="1200" dirty="0" smtClean="0">
+                <a:solidFill>
+                  <a:schemeClr val="tx1"/>
+                </a:solidFill>
+                <a:effectLst/>
+                <a:latin typeface="+mn-lt"/>
+                <a:ea typeface="+mn-ea"/>
+                <a:cs typeface="+mn-cs"/>
+              </a:rPr>
+              <a:t>un mois et une semaine </a:t>
+            </a:r>
+          </a:p>
+          <a:p>
+            <a:endParaRPr lang="fr-CM" sz="1200" kern="1200" dirty="0" smtClean="0">
+              <a:solidFill>
+                <a:schemeClr val="tx1"/>
+              </a:solidFill>
+              <a:effectLst/>
+              <a:latin typeface="+mn-lt"/>
+              <a:ea typeface="+mn-ea"/>
+              <a:cs typeface="+mn-cs"/>
+            </a:endParaRPr>
+          </a:p>
+          <a:p>
+            <a:r>
+              <a:rPr lang="fr-CM" sz="1200" kern="1200" dirty="0" smtClean="0">
+                <a:solidFill>
+                  <a:schemeClr val="tx1"/>
+                </a:solidFill>
+                <a:effectLst/>
+                <a:latin typeface="+mn-lt"/>
+                <a:ea typeface="+mn-ea"/>
+                <a:cs typeface="+mn-cs"/>
+              </a:rPr>
+              <a:t>Technologique :</a:t>
+            </a:r>
+          </a:p>
+          <a:p>
+            <a:pPr lvl="0"/>
+            <a:r>
+              <a:rPr lang="fr-CM" sz="1200" kern="1200" baseline="0" dirty="0" smtClean="0">
+                <a:solidFill>
+                  <a:schemeClr val="tx1"/>
+                </a:solidFill>
+                <a:effectLst/>
+                <a:latin typeface="+mn-lt"/>
+                <a:ea typeface="+mn-ea"/>
+                <a:cs typeface="+mn-cs"/>
+              </a:rPr>
+              <a:t>- </a:t>
+            </a:r>
+            <a:r>
+              <a:rPr lang="fr-CM" sz="1200" kern="1200" dirty="0" smtClean="0">
+                <a:solidFill>
+                  <a:schemeClr val="tx1"/>
+                </a:solidFill>
+                <a:effectLst/>
+                <a:latin typeface="+mn-lt"/>
+                <a:ea typeface="+mn-ea"/>
+                <a:cs typeface="+mn-cs"/>
+              </a:rPr>
+              <a:t>Technologies de </a:t>
+            </a:r>
+            <a:r>
+              <a:rPr lang="fr-CM" sz="1200" b="1" kern="1200" dirty="0" smtClean="0">
+                <a:solidFill>
+                  <a:schemeClr val="tx1"/>
+                </a:solidFill>
+                <a:effectLst/>
+                <a:latin typeface="+mn-lt"/>
+                <a:ea typeface="+mn-ea"/>
+                <a:cs typeface="+mn-cs"/>
+              </a:rPr>
+              <a:t>visualisation de données</a:t>
+            </a:r>
+            <a:r>
+              <a:rPr lang="fr-CM" sz="1200" kern="1200" dirty="0" smtClean="0">
+                <a:solidFill>
+                  <a:schemeClr val="tx1"/>
+                </a:solidFill>
+                <a:effectLst/>
+                <a:latin typeface="+mn-lt"/>
+                <a:ea typeface="+mn-ea"/>
+                <a:cs typeface="+mn-cs"/>
+              </a:rPr>
+              <a:t> (type Chart.js, </a:t>
+            </a:r>
+            <a:r>
+              <a:rPr lang="fr-CM" sz="1200" kern="1200" dirty="0" err="1" smtClean="0">
+                <a:solidFill>
+                  <a:schemeClr val="tx1"/>
+                </a:solidFill>
+                <a:effectLst/>
+                <a:latin typeface="+mn-lt"/>
+                <a:ea typeface="+mn-ea"/>
+                <a:cs typeface="+mn-cs"/>
+              </a:rPr>
+              <a:t>Plotly</a:t>
+            </a:r>
+            <a:r>
+              <a:rPr lang="fr-CM" sz="1200" kern="1200" dirty="0" smtClean="0">
+                <a:solidFill>
+                  <a:schemeClr val="tx1"/>
+                </a:solidFill>
+                <a:effectLst/>
+                <a:latin typeface="+mn-lt"/>
+                <a:ea typeface="+mn-ea"/>
+                <a:cs typeface="+mn-cs"/>
+              </a:rPr>
+              <a:t>, etc.),</a:t>
+            </a:r>
+            <a:endParaRPr lang="en-US" sz="1200" kern="1200" dirty="0" smtClean="0">
+              <a:solidFill>
+                <a:schemeClr val="tx1"/>
+              </a:solidFill>
+              <a:effectLst/>
+              <a:latin typeface="+mn-lt"/>
+              <a:ea typeface="+mn-ea"/>
+              <a:cs typeface="+mn-cs"/>
+            </a:endParaRPr>
+          </a:p>
+          <a:p>
+            <a:pPr lvl="0"/>
+            <a:r>
+              <a:rPr lang="fr-CM" sz="1200" kern="1200" dirty="0" smtClean="0">
+                <a:solidFill>
+                  <a:schemeClr val="tx1"/>
+                </a:solidFill>
+                <a:effectLst/>
+                <a:latin typeface="+mn-lt"/>
+                <a:ea typeface="+mn-ea"/>
+                <a:cs typeface="+mn-cs"/>
+              </a:rPr>
+              <a:t>- Bibliothèques de </a:t>
+            </a:r>
+            <a:r>
+              <a:rPr lang="fr-CM" sz="1200" b="1" kern="1200" dirty="0" smtClean="0">
+                <a:solidFill>
+                  <a:schemeClr val="tx1"/>
+                </a:solidFill>
+                <a:effectLst/>
+                <a:latin typeface="+mn-lt"/>
+                <a:ea typeface="+mn-ea"/>
+                <a:cs typeface="+mn-cs"/>
+              </a:rPr>
+              <a:t>Machine/Deep Learning</a:t>
+            </a:r>
+            <a:r>
+              <a:rPr lang="fr-CM" sz="1200" kern="1200" dirty="0" smtClean="0">
+                <a:solidFill>
+                  <a:schemeClr val="tx1"/>
+                </a:solidFill>
+                <a:effectLst/>
+                <a:latin typeface="+mn-lt"/>
+                <a:ea typeface="+mn-ea"/>
+                <a:cs typeface="+mn-cs"/>
+              </a:rPr>
+              <a:t> pour le traitement prédictif (Python via des APIs, ou intégration avec des services comme </a:t>
+            </a:r>
+            <a:r>
+              <a:rPr lang="fr-CM" sz="1200" kern="1200" dirty="0" err="1" smtClean="0">
+                <a:solidFill>
+                  <a:schemeClr val="tx1"/>
+                </a:solidFill>
+                <a:effectLst/>
+                <a:latin typeface="+mn-lt"/>
+                <a:ea typeface="+mn-ea"/>
+                <a:cs typeface="+mn-cs"/>
+              </a:rPr>
+              <a:t>Hugging</a:t>
+            </a:r>
+            <a:r>
+              <a:rPr lang="fr-CM" sz="1200" kern="1200" dirty="0" smtClean="0">
+                <a:solidFill>
+                  <a:schemeClr val="tx1"/>
+                </a:solidFill>
+                <a:effectLst/>
+                <a:latin typeface="+mn-lt"/>
+                <a:ea typeface="+mn-ea"/>
+                <a:cs typeface="+mn-cs"/>
+              </a:rPr>
+              <a:t> Face),</a:t>
+            </a:r>
+            <a:endParaRPr lang="en-US" sz="1200" kern="1200" dirty="0" smtClean="0">
+              <a:solidFill>
+                <a:schemeClr val="tx1"/>
+              </a:solidFill>
+              <a:effectLst/>
+              <a:latin typeface="+mn-lt"/>
+              <a:ea typeface="+mn-ea"/>
+              <a:cs typeface="+mn-cs"/>
+            </a:endParaRPr>
+          </a:p>
+          <a:p>
+            <a:r>
+              <a:rPr lang="en-US" sz="1200" kern="1200" dirty="0" smtClean="0">
+                <a:solidFill>
+                  <a:schemeClr val="tx1"/>
+                </a:solidFill>
+                <a:effectLst/>
+                <a:latin typeface="+mn-lt"/>
+                <a:ea typeface="+mn-ea"/>
+                <a:cs typeface="+mn-cs"/>
+              </a:rPr>
+              <a:t>- </a:t>
+            </a:r>
+            <a:r>
+              <a:rPr lang="en-US" sz="1200" kern="1200" dirty="0" err="1" smtClean="0">
+                <a:solidFill>
+                  <a:schemeClr val="tx1"/>
+                </a:solidFill>
+                <a:effectLst/>
+                <a:latin typeface="+mn-lt"/>
+                <a:ea typeface="+mn-ea"/>
+                <a:cs typeface="+mn-cs"/>
+              </a:rPr>
+              <a:t>Outils</a:t>
+            </a:r>
+            <a:r>
+              <a:rPr lang="en-US" sz="1200" kern="1200" dirty="0" smtClean="0">
+                <a:solidFill>
+                  <a:schemeClr val="tx1"/>
+                </a:solidFill>
+                <a:effectLst/>
+                <a:latin typeface="+mn-lt"/>
+                <a:ea typeface="+mn-ea"/>
+                <a:cs typeface="+mn-cs"/>
+              </a:rPr>
+              <a:t> de </a:t>
+            </a:r>
+            <a:r>
+              <a:rPr lang="en-US" sz="1200" b="1" kern="1200" dirty="0" err="1" smtClean="0">
+                <a:solidFill>
+                  <a:schemeClr val="tx1"/>
+                </a:solidFill>
+                <a:effectLst/>
+                <a:latin typeface="+mn-lt"/>
+                <a:ea typeface="+mn-ea"/>
+                <a:cs typeface="+mn-cs"/>
+              </a:rPr>
+              <a:t>vocalisation</a:t>
+            </a:r>
+            <a:r>
+              <a:rPr lang="en-US" sz="1200" kern="1200" dirty="0" smtClean="0">
+                <a:solidFill>
+                  <a:schemeClr val="tx1"/>
+                </a:solidFill>
+                <a:effectLst/>
+                <a:latin typeface="+mn-lt"/>
+                <a:ea typeface="+mn-ea"/>
+                <a:cs typeface="+mn-cs"/>
+              </a:rPr>
+              <a:t> (text-to-speech / speech-to-text) et </a:t>
+            </a:r>
+            <a:r>
+              <a:rPr lang="en-US" sz="1200" kern="1200" dirty="0" err="1" smtClean="0">
+                <a:solidFill>
+                  <a:schemeClr val="tx1"/>
+                </a:solidFill>
+                <a:effectLst/>
+                <a:latin typeface="+mn-lt"/>
+                <a:ea typeface="+mn-ea"/>
+                <a:cs typeface="+mn-cs"/>
+              </a:rPr>
+              <a:t>textuels</a:t>
+            </a:r>
+            <a:r>
+              <a:rPr lang="en-US" sz="1200" kern="1200" dirty="0" smtClean="0">
+                <a:solidFill>
+                  <a:schemeClr val="tx1"/>
+                </a:solidFill>
+                <a:effectLst/>
+                <a:latin typeface="+mn-lt"/>
+                <a:ea typeface="+mn-ea"/>
+                <a:cs typeface="+mn-cs"/>
+              </a:rPr>
+              <a:t> (Text Generator) pour </a:t>
+            </a:r>
+            <a:r>
+              <a:rPr lang="en-US" sz="1200" kern="1200" dirty="0" err="1" smtClean="0">
+                <a:solidFill>
+                  <a:schemeClr val="tx1"/>
+                </a:solidFill>
+                <a:effectLst/>
+                <a:latin typeface="+mn-lt"/>
+                <a:ea typeface="+mn-ea"/>
+                <a:cs typeface="+mn-cs"/>
+              </a:rPr>
+              <a:t>l’agent</a:t>
+            </a:r>
+            <a:r>
+              <a:rPr lang="en-US" sz="1200" kern="1200" dirty="0" smtClean="0">
+                <a:solidFill>
+                  <a:schemeClr val="tx1"/>
+                </a:solidFill>
+                <a:effectLst/>
+                <a:latin typeface="+mn-lt"/>
+                <a:ea typeface="+mn-ea"/>
+                <a:cs typeface="+mn-cs"/>
+              </a:rPr>
+              <a:t> </a:t>
+            </a:r>
+            <a:r>
+              <a:rPr lang="en-US" sz="1200" kern="1200" dirty="0" err="1" smtClean="0">
+                <a:solidFill>
+                  <a:schemeClr val="tx1"/>
+                </a:solidFill>
+                <a:effectLst/>
+                <a:latin typeface="+mn-lt"/>
+                <a:ea typeface="+mn-ea"/>
+                <a:cs typeface="+mn-cs"/>
+              </a:rPr>
+              <a:t>conversationnel</a:t>
+            </a:r>
+            <a:r>
+              <a:rPr lang="en-US" sz="1200" kern="1200" dirty="0" smtClean="0">
+                <a:solidFill>
+                  <a:schemeClr val="tx1"/>
+                </a:solidFill>
+                <a:effectLst/>
+                <a:latin typeface="+mn-lt"/>
+                <a:ea typeface="+mn-ea"/>
+                <a:cs typeface="+mn-cs"/>
+              </a:rPr>
+              <a:t>.</a:t>
+            </a:r>
+            <a:endParaRPr lang="fr-CM" sz="1200" kern="1200" dirty="0" smtClean="0">
+              <a:solidFill>
+                <a:schemeClr val="tx1"/>
+              </a:solidFill>
+              <a:effectLst/>
+              <a:latin typeface="+mn-lt"/>
+              <a:ea typeface="+mn-ea"/>
+              <a:cs typeface="+mn-cs"/>
+            </a:endParaRPr>
+          </a:p>
+          <a:p>
+            <a:endParaRPr lang="fr-CM" sz="1200" kern="1200" dirty="0" smtClean="0">
+              <a:solidFill>
+                <a:schemeClr val="tx1"/>
+              </a:solidFill>
+              <a:effectLst/>
+              <a:latin typeface="+mn-lt"/>
+              <a:ea typeface="+mn-ea"/>
+              <a:cs typeface="+mn-cs"/>
+            </a:endParaRPr>
+          </a:p>
+          <a:p>
+            <a:endParaRPr lang="fr-CM" sz="1200" kern="1200" dirty="0" smtClean="0">
+              <a:solidFill>
+                <a:schemeClr val="tx1"/>
+              </a:solidFill>
+              <a:effectLst/>
+              <a:latin typeface="+mn-lt"/>
+              <a:ea typeface="+mn-ea"/>
+              <a:cs typeface="+mn-cs"/>
+            </a:endParaRPr>
+          </a:p>
+          <a:p>
+            <a:r>
+              <a:rPr lang="fr-CM" sz="1200" kern="1200" dirty="0" smtClean="0">
+                <a:solidFill>
+                  <a:schemeClr val="tx1"/>
+                </a:solidFill>
+                <a:effectLst/>
+                <a:latin typeface="+mn-lt"/>
+                <a:ea typeface="+mn-ea"/>
+                <a:cs typeface="+mn-cs"/>
+              </a:rPr>
+              <a:t>Fonctionnelle</a:t>
+            </a:r>
+            <a:r>
+              <a:rPr lang="fr-CM" sz="1200" kern="1200" baseline="0" dirty="0" smtClean="0">
+                <a:solidFill>
+                  <a:schemeClr val="tx1"/>
+                </a:solidFill>
+                <a:effectLst/>
+                <a:latin typeface="+mn-lt"/>
+                <a:ea typeface="+mn-ea"/>
+                <a:cs typeface="+mn-cs"/>
+              </a:rPr>
+              <a:t> :</a:t>
+            </a:r>
+          </a:p>
+          <a:p>
+            <a:r>
+              <a:rPr lang="fr-CM" sz="1200" kern="1200" dirty="0" smtClean="0">
+                <a:solidFill>
+                  <a:schemeClr val="tx1"/>
+                </a:solidFill>
+                <a:effectLst/>
+                <a:latin typeface="+mn-lt"/>
+                <a:ea typeface="+mn-ea"/>
+                <a:cs typeface="+mn-cs"/>
+              </a:rPr>
+              <a:t>Les prédictions proposées et les Dashboard se limitent à des cas simples (par exemple : taux d’occupation estimé, évolution du stock de médicaments, etc.) et n’intègrent pas encore des modèles complexes ou auto-apprenants en continu. </a:t>
+            </a:r>
+          </a:p>
+          <a:p>
+            <a:endParaRPr lang="fr-CM" sz="1200" kern="1200" dirty="0" smtClean="0">
+              <a:solidFill>
+                <a:schemeClr val="tx1"/>
+              </a:solidFill>
+              <a:effectLst/>
+              <a:latin typeface="+mn-lt"/>
+              <a:ea typeface="+mn-ea"/>
+              <a:cs typeface="+mn-cs"/>
+            </a:endParaRPr>
+          </a:p>
+          <a:p>
+            <a:endParaRPr lang="fr-CM" sz="1200" kern="1200" dirty="0" smtClean="0">
+              <a:solidFill>
+                <a:schemeClr val="tx1"/>
+              </a:solidFill>
+              <a:effectLst/>
+              <a:latin typeface="+mn-lt"/>
+              <a:ea typeface="+mn-ea"/>
+              <a:cs typeface="+mn-cs"/>
+            </a:endParaRPr>
+          </a:p>
+          <a:p>
+            <a:endParaRPr lang="fr-CM" sz="1200" kern="1200" dirty="0" smtClean="0">
+              <a:solidFill>
+                <a:schemeClr val="tx1"/>
+              </a:solidFill>
+              <a:effectLst/>
+              <a:latin typeface="+mn-lt"/>
+              <a:ea typeface="+mn-ea"/>
+              <a:cs typeface="+mn-cs"/>
+            </a:endParaRPr>
+          </a:p>
+        </p:txBody>
+      </p:sp>
+      <p:sp>
+        <p:nvSpPr>
+          <p:cNvPr id="4" name="Espace réservé du numéro de diapositive 3"/>
+          <p:cNvSpPr>
+            <a:spLocks noGrp="1"/>
+          </p:cNvSpPr>
+          <p:nvPr>
+            <p:ph type="sldNum" sz="quarter" idx="10"/>
+          </p:nvPr>
+        </p:nvSpPr>
+        <p:spPr/>
+        <p:txBody>
+          <a:bodyPr/>
+          <a:lstStyle/>
+          <a:p>
+            <a:fld id="{9EB718E3-4971-4414-9710-CD5B1E03284D}" type="slidenum">
+              <a:rPr lang="en-US" smtClean="0"/>
+              <a:t>12</a:t>
+            </a:fld>
+            <a:endParaRPr lang="en-US"/>
+          </a:p>
+        </p:txBody>
+      </p:sp>
+    </p:spTree>
+    <p:extLst>
+      <p:ext uri="{BB962C8B-B14F-4D97-AF65-F5344CB8AC3E}">
+        <p14:creationId xmlns:p14="http://schemas.microsoft.com/office/powerpoint/2010/main" val="937407329"/>
+      </p:ext>
+    </p:extLst>
+  </p:cSld>
+  <p:clrMapOvr>
+    <a:masterClrMapping/>
+  </p:clrMapOvr>
+</p:notes>
 </file>
 
 <file path=ppt/slideLayouts/slideLayout1.xml><?xml version="1.0" encoding="utf-8"?>
@@ -303,7 +2122,7 @@
           <a:p>
             <a:fld id="{D794CFB1-D59C-4A37-9CF9-842C7AEAF981}" type="datetimeFigureOut">
               <a:rPr lang="en-US" smtClean="0"/>
-              <a:t>8/6/2025</a:t>
+              <a:t>8/8/2025</a:t>
             </a:fld>
             <a:endParaRPr lang="en-US"/>
           </a:p>
@@ -601,7 +2420,7 @@
           <a:p>
             <a:fld id="{D794CFB1-D59C-4A37-9CF9-842C7AEAF981}" type="datetimeFigureOut">
               <a:rPr lang="en-US" smtClean="0"/>
-              <a:t>8/6/2025</a:t>
+              <a:t>8/8/2025</a:t>
             </a:fld>
             <a:endParaRPr lang="en-US"/>
           </a:p>
@@ -793,7 +2612,7 @@
           <a:p>
             <a:fld id="{D794CFB1-D59C-4A37-9CF9-842C7AEAF981}" type="datetimeFigureOut">
               <a:rPr lang="en-US" smtClean="0"/>
-              <a:t>8/6/2025</a:t>
+              <a:t>8/8/2025</a:t>
             </a:fld>
             <a:endParaRPr lang="en-US"/>
           </a:p>
@@ -1054,7 +2873,7 @@
           <a:p>
             <a:fld id="{D794CFB1-D59C-4A37-9CF9-842C7AEAF981}" type="datetimeFigureOut">
               <a:rPr lang="en-US" smtClean="0"/>
-              <a:t>8/6/2025</a:t>
+              <a:t>8/8/2025</a:t>
             </a:fld>
             <a:endParaRPr lang="en-US"/>
           </a:p>
@@ -1478,7 +3297,7 @@
           <a:p>
             <a:fld id="{D794CFB1-D59C-4A37-9CF9-842C7AEAF981}" type="datetimeFigureOut">
               <a:rPr lang="en-US" smtClean="0"/>
-              <a:t>8/6/2025</a:t>
+              <a:t>8/8/2025</a:t>
             </a:fld>
             <a:endParaRPr lang="en-US"/>
           </a:p>
@@ -2015,7 +3834,7 @@
           <a:p>
             <a:fld id="{D794CFB1-D59C-4A37-9CF9-842C7AEAF981}" type="datetimeFigureOut">
               <a:rPr lang="en-US" smtClean="0"/>
-              <a:t>8/6/2025</a:t>
+              <a:t>8/8/2025</a:t>
             </a:fld>
             <a:endParaRPr lang="en-US"/>
           </a:p>
@@ -2879,7 +4698,7 @@
           <a:p>
             <a:fld id="{D794CFB1-D59C-4A37-9CF9-842C7AEAF981}" type="datetimeFigureOut">
               <a:rPr lang="en-US" smtClean="0"/>
-              <a:t>8/6/2025</a:t>
+              <a:t>8/8/2025</a:t>
             </a:fld>
             <a:endParaRPr lang="en-US"/>
           </a:p>
@@ -3049,7 +4868,7 @@
           <a:p>
             <a:fld id="{D794CFB1-D59C-4A37-9CF9-842C7AEAF981}" type="datetimeFigureOut">
               <a:rPr lang="en-US" smtClean="0"/>
-              <a:t>8/6/2025</a:t>
+              <a:t>8/8/2025</a:t>
             </a:fld>
             <a:endParaRPr lang="en-US"/>
           </a:p>
@@ -3233,7 +5052,7 @@
           <a:p>
             <a:fld id="{D794CFB1-D59C-4A37-9CF9-842C7AEAF981}" type="datetimeFigureOut">
               <a:rPr lang="en-US" smtClean="0"/>
-              <a:t>8/6/2025</a:t>
+              <a:t>8/8/2025</a:t>
             </a:fld>
             <a:endParaRPr lang="en-US"/>
           </a:p>
@@ -3403,7 +5222,7 @@
           <a:p>
             <a:fld id="{D794CFB1-D59C-4A37-9CF9-842C7AEAF981}" type="datetimeFigureOut">
               <a:rPr lang="en-US" smtClean="0"/>
-              <a:t>8/6/2025</a:t>
+              <a:t>8/8/2025</a:t>
             </a:fld>
             <a:endParaRPr lang="en-US"/>
           </a:p>
@@ -3647,7 +5466,7 @@
           <a:p>
             <a:fld id="{D794CFB1-D59C-4A37-9CF9-842C7AEAF981}" type="datetimeFigureOut">
               <a:rPr lang="en-US" smtClean="0"/>
-              <a:t>8/6/2025</a:t>
+              <a:t>8/8/2025</a:t>
             </a:fld>
             <a:endParaRPr lang="en-US"/>
           </a:p>
@@ -3883,7 +5702,7 @@
           <a:p>
             <a:fld id="{D794CFB1-D59C-4A37-9CF9-842C7AEAF981}" type="datetimeFigureOut">
               <a:rPr lang="en-US" smtClean="0"/>
-              <a:t>8/6/2025</a:t>
+              <a:t>8/8/2025</a:t>
             </a:fld>
             <a:endParaRPr lang="en-US"/>
           </a:p>
@@ -4349,7 +6168,7 @@
           <a:p>
             <a:fld id="{D794CFB1-D59C-4A37-9CF9-842C7AEAF981}" type="datetimeFigureOut">
               <a:rPr lang="en-US" smtClean="0"/>
-              <a:t>8/6/2025</a:t>
+              <a:t>8/8/2025</a:t>
             </a:fld>
             <a:endParaRPr lang="en-US"/>
           </a:p>
@@ -4467,7 +6286,7 @@
           <a:p>
             <a:fld id="{D794CFB1-D59C-4A37-9CF9-842C7AEAF981}" type="datetimeFigureOut">
               <a:rPr lang="en-US" smtClean="0"/>
-              <a:t>8/6/2025</a:t>
+              <a:t>8/8/2025</a:t>
             </a:fld>
             <a:endParaRPr lang="en-US"/>
           </a:p>
@@ -4562,7 +6381,7 @@
           <a:p>
             <a:fld id="{D794CFB1-D59C-4A37-9CF9-842C7AEAF981}" type="datetimeFigureOut">
               <a:rPr lang="en-US" smtClean="0"/>
-              <a:t>8/6/2025</a:t>
+              <a:t>8/8/2025</a:t>
             </a:fld>
             <a:endParaRPr lang="en-US"/>
           </a:p>
@@ -4817,7 +6636,7 @@
           <a:p>
             <a:fld id="{D794CFB1-D59C-4A37-9CF9-842C7AEAF981}" type="datetimeFigureOut">
               <a:rPr lang="en-US" smtClean="0"/>
-              <a:t>8/6/2025</a:t>
+              <a:t>8/8/2025</a:t>
             </a:fld>
             <a:endParaRPr lang="en-US"/>
           </a:p>
@@ -5117,7 +6936,7 @@
           <a:p>
             <a:fld id="{D794CFB1-D59C-4A37-9CF9-842C7AEAF981}" type="datetimeFigureOut">
               <a:rPr lang="en-US" smtClean="0"/>
-              <a:t>8/6/2025</a:t>
+              <a:t>8/8/2025</a:t>
             </a:fld>
             <a:endParaRPr lang="en-US"/>
           </a:p>
@@ -5351,7 +7170,7 @@
           <a:p>
             <a:fld id="{D794CFB1-D59C-4A37-9CF9-842C7AEAF981}" type="datetimeFigureOut">
               <a:rPr lang="en-US" smtClean="0"/>
-              <a:t>8/6/2025</a:t>
+              <a:t>8/8/2025</a:t>
             </a:fld>
             <a:endParaRPr lang="en-US"/>
           </a:p>
@@ -6134,19 +7953,7 @@
               <a:rPr lang="fr-CM" sz="2800" b="1" dirty="0" smtClean="0">
                 <a:latin typeface="Algerian" panose="04020705040A02060702" pitchFamily="82" charset="0"/>
               </a:rPr>
-              <a:t>TATOU </a:t>
-            </a:r>
-            <a:r>
-              <a:rPr lang="fr-CM" sz="2800" b="1" dirty="0" smtClean="0">
-                <a:latin typeface="Algerian" panose="04020705040A02060702" pitchFamily="82" charset="0"/>
-              </a:rPr>
-              <a:t>TATOU</a:t>
-            </a:r>
-            <a:r>
-              <a:rPr lang="fr-CM" sz="2800" b="1" dirty="0" smtClean="0">
-                <a:latin typeface="Algerian" panose="04020705040A02060702" pitchFamily="82" charset="0"/>
-              </a:rPr>
-              <a:t> Josias Nathan</a:t>
+              <a:t>TATOU TATOU Josias Nathan</a:t>
             </a:r>
             <a:endParaRPr lang="en-US" sz="2800" b="1" dirty="0">
               <a:latin typeface="Algerian" panose="04020705040A02060702" pitchFamily="82" charset="0"/>
@@ -6488,10 +8295,24 @@
         </p:nvSpPr>
         <p:spPr/>
         <p:txBody>
-          <a:bodyPr/>
+          <a:bodyPr>
+            <a:normAutofit/>
+          </a:bodyPr>
           <a:lstStyle/>
           <a:p>
-            <a:endParaRPr lang="en-US"/>
+            <a:r>
+              <a:rPr lang="fr-CM" sz="4800" u="sng" dirty="0" smtClean="0">
+                <a:solidFill>
+                  <a:srgbClr val="FFC000"/>
+                </a:solidFill>
+              </a:rPr>
+              <a:t>Délimitations</a:t>
+            </a:r>
+            <a:endParaRPr lang="en-US" sz="4800" u="sng" dirty="0">
+              <a:solidFill>
+                <a:srgbClr val="FFC000"/>
+              </a:solidFill>
+            </a:endParaRPr>
           </a:p>
         </p:txBody>
       </p:sp>
@@ -6505,19 +8326,80 @@
             <p:ph idx="1"/>
           </p:nvPr>
         </p:nvSpPr>
-        <p:spPr/>
-        <p:txBody>
-          <a:bodyPr/>
+        <p:spPr>
+          <a:xfrm>
+            <a:off x="913795" y="1732449"/>
+            <a:ext cx="10353762" cy="4552441"/>
+          </a:xfrm>
+        </p:spPr>
+        <p:txBody>
+          <a:bodyPr>
+            <a:normAutofit/>
+          </a:bodyPr>
           <a:lstStyle/>
           <a:p>
-            <a:endParaRPr lang="en-US"/>
+            <a:r>
+              <a:rPr lang="fr-CM" sz="3200" dirty="0" smtClean="0"/>
+              <a:t>Thématique</a:t>
+            </a:r>
+            <a:endParaRPr lang="fr-CM" sz="3200" dirty="0"/>
+          </a:p>
+          <a:p>
+            <a:r>
+              <a:rPr lang="fr-CM" sz="3200" dirty="0" smtClean="0">
+                <a:effectLst/>
+                <a:latin typeface="Cambria" panose="02040503050406030204" pitchFamily="18" charset="0"/>
+                <a:ea typeface="Calibri" panose="020F0502020204030204" pitchFamily="34" charset="0"/>
+                <a:cs typeface="Times New Roman" panose="02020603050405020304" pitchFamily="18" charset="0"/>
+              </a:rPr>
+              <a:t>Spatio-temporelle</a:t>
+            </a:r>
+            <a:endParaRPr lang="fr-CM" sz="3200" dirty="0" smtClean="0">
+              <a:effectLst/>
+              <a:latin typeface="Cambria" panose="02040503050406030204" pitchFamily="18" charset="0"/>
+              <a:ea typeface="Calibri" panose="020F0502020204030204" pitchFamily="34" charset="0"/>
+              <a:cs typeface="Times New Roman" panose="02020603050405020304" pitchFamily="18" charset="0"/>
+            </a:endParaRPr>
+          </a:p>
+          <a:p>
+            <a:r>
+              <a:rPr lang="fr-CM" sz="3200" dirty="0" smtClean="0">
+                <a:effectLst/>
+                <a:latin typeface="Cambria" panose="02040503050406030204" pitchFamily="18" charset="0"/>
+                <a:ea typeface="Calibri" panose="020F0502020204030204" pitchFamily="34" charset="0"/>
+                <a:cs typeface="Times New Roman" panose="02020603050405020304" pitchFamily="18" charset="0"/>
+              </a:rPr>
+              <a:t>Technologique</a:t>
+            </a:r>
+            <a:endParaRPr lang="fr-CM" sz="3200" dirty="0" smtClean="0">
+              <a:effectLst/>
+              <a:latin typeface="Cambria" panose="02040503050406030204" pitchFamily="18" charset="0"/>
+              <a:ea typeface="Calibri" panose="020F0502020204030204" pitchFamily="34" charset="0"/>
+              <a:cs typeface="Times New Roman" panose="02020603050405020304" pitchFamily="18" charset="0"/>
+            </a:endParaRPr>
+          </a:p>
+          <a:p>
+            <a:r>
+              <a:rPr lang="fr-CM" sz="3200" dirty="0" smtClean="0">
+                <a:effectLst/>
+                <a:latin typeface="Cambria" panose="02040503050406030204" pitchFamily="18" charset="0"/>
+                <a:cs typeface="Times New Roman" panose="02020603050405020304" pitchFamily="18" charset="0"/>
+              </a:rPr>
+              <a:t>Fonctionnelle</a:t>
+            </a:r>
+            <a:endParaRPr lang="fr-CM" sz="3200" dirty="0" smtClean="0">
+              <a:effectLst/>
+              <a:latin typeface="Cambria" panose="02040503050406030204" pitchFamily="18" charset="0"/>
+              <a:ea typeface="Calibri" panose="020F0502020204030204" pitchFamily="34" charset="0"/>
+              <a:cs typeface="Times New Roman" panose="02020603050405020304" pitchFamily="18" charset="0"/>
+            </a:endParaRPr>
           </a:p>
         </p:txBody>
       </p:sp>
     </p:spTree>
     <p:extLst>
       <p:ext uri="{BB962C8B-B14F-4D97-AF65-F5344CB8AC3E}">
-        <p14:creationId xmlns:p14="http://schemas.microsoft.com/office/powerpoint/2010/main" val="279345639"/>
+        <p14:creationId xmlns:p14="http://schemas.microsoft.com/office/powerpoint/2010/main" val="527778358"/>
       </p:ext>
     </p:extLst>
   </p:cSld>
@@ -6945,11 +8827,7 @@
             </a:r>
             <a:r>
               <a:rPr lang="fr-CM" sz="3600" dirty="0"/>
-              <a:t>ne </a:t>
-            </a:r>
-            <a:r>
-              <a:rPr lang="fr-CM" sz="3600" dirty="0"/>
-              <a:t>dispose pas à ce jour de fonctionnalités facilitant sa prise en main, ni d’outils d’analyse ou de projection basés sur les données hospitalières collectées.</a:t>
+              <a:t>ne dispose pas à ce jour de fonctionnalités facilitant sa prise en main, ni d’outils d’analyse ou de projection basés sur les données hospitalières collectées.</a:t>
             </a:r>
             <a:endParaRPr lang="en-US" sz="3600" dirty="0"/>
           </a:p>
@@ -7726,4 +9604,265 @@
     </a:ext>
   </a:extLst>
 </a:theme>
+</file>
+
+<file path=ppt/theme/theme2.xml><?xml version="1.0" encoding="utf-8"?>
+<a:theme xmlns:a="http://schemas.openxmlformats.org/drawingml/2006/main" name="Thème Office">
+  <a:themeElements>
+    <a:clrScheme name="Office">
+      <a:dk1>
+        <a:sysClr val="windowText" lastClr="000000"/>
+      </a:dk1>
+      <a:lt1>
+        <a:sysClr val="window" lastClr="FFFFFF"/>
+      </a:lt1>
+      <a:dk2>
+        <a:srgbClr val="44546A"/>
+      </a:dk2>
+      <a:lt2>
+        <a:srgbClr val="E7E6E6"/>
+      </a:lt2>
+      <a:accent1>
+        <a:srgbClr val="5B9BD5"/>
+      </a:accent1>
+      <a:accent2>
+        <a:srgbClr val="ED7D31"/>
+      </a:accent2>
+      <a:accent3>
+        <a:srgbClr val="A5A5A5"/>
+      </a:accent3>
+      <a:accent4>
+        <a:srgbClr val="FFC000"/>
+      </a:accent4>
+      <a:accent5>
+        <a:srgbClr val="4472C4"/>
+      </a:accent5>
+      <a:accent6>
+        <a:srgbClr val="70AD47"/>
+      </a:accent6>
+      <a:hlink>
+        <a:srgbClr val="0563C1"/>
+      </a:hlink>
+      <a:folHlink>
+        <a:srgbClr val="954F72"/>
+      </a:folHlink>
+    </a:clrScheme>
+    <a:fontScheme name="Office">
+      <a:majorFont>
+        <a:latin typeface="Calibri Light" panose="020F0302020204030204"/>
+        <a:ea typeface=""/>
+        <a:cs typeface=""/>
+        <a:font script="Jpan" typeface="游ゴシック Light"/>
+        <a:font script="Hang" typeface="맑은 고딕"/>
+        <a:font script="Hans" typeface="等线 Light"/>
+        <a:font script="Hant" typeface="新細明體"/>
+        <a:font script="Arab" typeface="Times New Roman"/>
+        <a:font script="Hebr" typeface="Times New Roman"/>
+        <a:font script="Thai" typeface="Angsana New"/>
+        <a:font script="Ethi" typeface="Nyala"/>
+        <a:font script="Beng" typeface="Vrinda"/>
+        <a:font script="Gujr" typeface="Shruti"/>
+        <a:font script="Khmr" typeface="MoolBoran"/>
+        <a:font script="Knda" typeface="Tunga"/>
+        <a:font script="Guru" typeface="Raavi"/>
+        <a:font script="Cans" typeface="Euphemia"/>
+        <a:font script="Cher" typeface="Plantagenet Cherokee"/>
+        <a:font script="Yiii" typeface="Microsoft Yi Baiti"/>
+        <a:font script="Tibt" typeface="Microsoft Himalaya"/>
+        <a:font script="Thaa" typeface="MV Boli"/>
+        <a:font script="Deva" typeface="Mangal"/>
+        <a:font script="Telu" typeface="Gautami"/>
+        <a:font script="Taml" typeface="Latha"/>
+        <a:font script="Syrc" typeface="Estrangelo Edessa"/>
+        <a:font script="Orya" typeface="Kalinga"/>
+        <a:font script="Mlym" typeface="Kartika"/>
+        <a:font script="Laoo" typeface="DokChampa"/>
+        <a:font script="Sinh" typeface="Iskoola Pota"/>
+        <a:font script="Mong" typeface="Mongolian Baiti"/>
+        <a:font script="Viet" typeface="Times New Roman"/>
+        <a:font script="Uigh" typeface="Microsoft Uighur"/>
+        <a:font script="Geor" typeface="Sylfaen"/>
+      </a:majorFont>
+      <a:minorFont>
+        <a:latin typeface="Calibri" panose="020F0502020204030204"/>
+        <a:ea typeface=""/>
+        <a:cs typeface=""/>
+        <a:font script="Jpan" typeface="游ゴシック"/>
+        <a:font script="Hang" typeface="맑은 고딕"/>
+        <a:font script="Hans" typeface="等线"/>
+        <a:font script="Hant" typeface="新細明體"/>
+        <a:font script="Arab" typeface="Arial"/>
+        <a:font script="Hebr" typeface="Arial"/>
+        <a:font script="Thai" typeface="Cordia New"/>
+        <a:font script="Ethi" typeface="Nyala"/>
+        <a:font script="Beng" typeface="Vrinda"/>
+        <a:font script="Gujr" typeface="Shruti"/>
+        <a:font script="Khmr" typeface="DaunPenh"/>
+        <a:font script="Knda" typeface="Tunga"/>
+        <a:font script="Guru" typeface="Raavi"/>
+        <a:font script="Cans" typeface="Euphemia"/>
+        <a:font script="Cher" typeface="Plantagenet Cherokee"/>
+        <a:font script="Yiii" typeface="Microsoft Yi Baiti"/>
+        <a:font script="Tibt" typeface="Microsoft Himalaya"/>
+        <a:font script="Thaa" typeface="MV Boli"/>
+        <a:font script="Deva" typeface="Mangal"/>
+        <a:font script="Telu" typeface="Gautami"/>
+        <a:font script="Taml" typeface="Latha"/>
+        <a:font script="Syrc" typeface="Estrangelo Edessa"/>
+        <a:font script="Orya" typeface="Kalinga"/>
+        <a:font script="Mlym" typeface="Kartika"/>
+        <a:font script="Laoo" typeface="DokChampa"/>
+        <a:font script="Sinh" typeface="Iskoola Pota"/>
+        <a:font script="Mong" typeface="Mongolian Baiti"/>
+        <a:font script="Viet" typeface="Arial"/>
+        <a:font script="Uigh" typeface="Microsoft Uighur"/>
+        <a:font script="Geor" typeface="Sylfaen"/>
+      </a:minorFont>
+    </a:fontScheme>
+    <a:fmtScheme name="Office">
+      <a:fillStyleLst>
+        <a:solidFill>
+          <a:schemeClr val="phClr"/>
+        </a:solidFill>
+        <a:gradFill rotWithShape="1">
+          <a:gsLst>
+            <a:gs pos="0">
+              <a:schemeClr val="phClr">
+                <a:lumMod val="110000"/>
+                <a:satMod val="105000"/>
+                <a:tint val="67000"/>
+              </a:schemeClr>
+            </a:gs>
+            <a:gs pos="50000">
+              <a:schemeClr val="phClr">
+                <a:lumMod val="105000"/>
+                <a:satMod val="103000"/>
+                <a:tint val="73000"/>
+              </a:schemeClr>
+            </a:gs>
+            <a:gs pos="100000">
+              <a:schemeClr val="phClr">
+                <a:lumMod val="105000"/>
+                <a:satMod val="109000"/>
+                <a:tint val="81000"/>
+              </a:schemeClr>
+            </a:gs>
+          </a:gsLst>
+          <a:lin ang="5400000" scaled="0"/>
+        </a:gradFill>
+        <a:gradFill rotWithShape="1">
+          <a:gsLst>
+            <a:gs pos="0">
+              <a:schemeClr val="phClr">
+                <a:satMod val="103000"/>
+                <a:lumMod val="102000"/>
+                <a:tint val="94000"/>
+              </a:schemeClr>
+            </a:gs>
+            <a:gs pos="50000">
+              <a:schemeClr val="phClr">
+                <a:satMod val="110000"/>
+                <a:lumMod val="100000"/>
+                <a:shade val="100000"/>
+              </a:schemeClr>
+            </a:gs>
+            <a:gs pos="100000">
+              <a:schemeClr val="phClr">
+                <a:lumMod val="99000"/>
+                <a:satMod val="120000"/>
+                <a:shade val="78000"/>
+              </a:schemeClr>
+            </a:gs>
+          </a:gsLst>
+          <a:lin ang="5400000" scaled="0"/>
+        </a:gradFill>
+      </a:fillStyleLst>
+      <a:lnStyleLst>
+        <a:ln w="6350" cap="flat" cmpd="sng" algn="ctr">
+          <a:solidFill>
+            <a:schemeClr val="phClr"/>
+          </a:solidFill>
+          <a:prstDash val="solid"/>
+          <a:miter lim="800000"/>
+        </a:ln>
+        <a:ln w="12700" cap="flat" cmpd="sng" algn="ctr">
+          <a:solidFill>
+            <a:schemeClr val="phClr"/>
+          </a:solidFill>
+          <a:prstDash val="solid"/>
+          <a:miter lim="800000"/>
+        </a:ln>
+        <a:ln w="19050" cap="flat" cmpd="sng" algn="ctr">
+          <a:solidFill>
+            <a:schemeClr val="phClr"/>
+          </a:solidFill>
+          <a:prstDash val="solid"/>
+          <a:miter lim="800000"/>
+        </a:ln>
+      </a:lnStyleLst>
+      <a:effectStyleLst>
+        <a:effectStyle>
+          <a:effectLst/>
+        </a:effectStyle>
+        <a:effectStyle>
+          <a:effectLst/>
+        </a:effectStyle>
+        <a:effectStyle>
+          <a:effectLst>
+            <a:outerShdw blurRad="57150" dist="19050" dir="5400000" algn="ctr" rotWithShape="0">
+              <a:srgbClr val="000000">
+                <a:alpha val="63000"/>
+              </a:srgbClr>
+            </a:outerShdw>
+          </a:effectLst>
+        </a:effectStyle>
+      </a:effectStyleLst>
+      <a:bgFillStyleLst>
+        <a:solidFill>
+          <a:schemeClr val="phClr"/>
+        </a:solidFill>
+        <a:solidFill>
+          <a:schemeClr val="phClr">
+            <a:tint val="95000"/>
+            <a:satMod val="170000"/>
+          </a:schemeClr>
+        </a:solidFill>
+        <a:gradFill rotWithShape="1">
+          <a:gsLst>
+            <a:gs pos="0">
+              <a:schemeClr val="phClr">
+                <a:tint val="93000"/>
+                <a:satMod val="150000"/>
+                <a:shade val="98000"/>
+                <a:lumMod val="102000"/>
+              </a:schemeClr>
+            </a:gs>
+            <a:gs pos="50000">
+              <a:schemeClr val="phClr">
+                <a:tint val="98000"/>
+                <a:satMod val="130000"/>
+                <a:shade val="90000"/>
+                <a:lumMod val="103000"/>
+              </a:schemeClr>
+            </a:gs>
+            <a:gs pos="100000">
+              <a:schemeClr val="phClr">
+                <a:shade val="63000"/>
+                <a:satMod val="120000"/>
+              </a:schemeClr>
+            </a:gs>
+          </a:gsLst>
+          <a:lin ang="5400000" scaled="0"/>
+        </a:gradFill>
+      </a:bgFillStyleLst>
+    </a:fmtScheme>
+  </a:themeElements>
+  <a:objectDefaults/>
+  <a:extraClrSchemeLst/>
+  <a:extLst>
+    <a:ext uri="{05A4C25C-085E-4340-85A3-A5531E510DB2}">
+      <thm15:themeFamily xmlns:thm15="http://schemas.microsoft.com/office/thememl/2012/main" name="Office Theme" id="{62F939B6-93AF-4DB8-9C6B-D6C7DFDC589F}" vid="{4A3C46E8-61CC-4603-A589-7422A47A8E4A}"/>
+    </a:ext>
+  </a:extLst>
+</a:theme>
 </file>
</xml_diff>